<commit_message>
[Symposium] Final draft on presentation
</commit_message>
<xml_diff>
--- a/Documents/Symposium/Symposium.pptx
+++ b/Documents/Symposium/Symposium.pptx
@@ -5,10 +5,10 @@
     <p:sldMasterId id="2147483666" r:id="rId4"/>
   </p:sldMasterIdLst>
   <p:notesMasterIdLst>
-    <p:notesMasterId r:id="rId17"/>
+    <p:notesMasterId r:id="rId15"/>
   </p:notesMasterIdLst>
   <p:handoutMasterIdLst>
-    <p:handoutMasterId r:id="rId18"/>
+    <p:handoutMasterId r:id="rId16"/>
   </p:handoutMasterIdLst>
   <p:sldIdLst>
     <p:sldId id="256" r:id="rId5"/>
@@ -16,13 +16,11 @@
     <p:sldId id="261" r:id="rId7"/>
     <p:sldId id="262" r:id="rId8"/>
     <p:sldId id="289" r:id="rId9"/>
-    <p:sldId id="264" r:id="rId10"/>
-    <p:sldId id="291" r:id="rId11"/>
-    <p:sldId id="278" r:id="rId12"/>
-    <p:sldId id="293" r:id="rId13"/>
-    <p:sldId id="296" r:id="rId14"/>
-    <p:sldId id="290" r:id="rId15"/>
-    <p:sldId id="276" r:id="rId16"/>
+    <p:sldId id="291" r:id="rId10"/>
+    <p:sldId id="278" r:id="rId11"/>
+    <p:sldId id="293" r:id="rId12"/>
+    <p:sldId id="296" r:id="rId13"/>
+    <p:sldId id="276" r:id="rId14"/>
   </p:sldIdLst>
   <p:sldSz cx="12192000" cy="6858000"/>
   <p:notesSz cx="6858000" cy="9144000"/>
@@ -251,7 +249,7 @@
             <a:pPr rtl="0"/>
             <a:fld id="{4245C065-7973-41A8-A2CC-441A8BA3384C}" type="datetime1">
               <a:rPr lang="en-GB" smtClean="0"/>
-              <a:t>05/03/2025</a:t>
+              <a:t>06/05/2025</a:t>
             </a:fld>
             <a:endParaRPr lang="en-GB"/>
           </a:p>
@@ -433,7 +431,7 @@
             <a:fld id="{A087A586-3225-45EC-B90F-43F9676D14C2}" type="datetime1">
               <a:rPr lang="en-GB" smtClean="0"/>
               <a:pPr/>
-              <a:t>05/03/2025</a:t>
+              <a:t>06/05/2025</a:t>
             </a:fld>
             <a:endParaRPr lang="en-GB" dirty="0"/>
           </a:p>
@@ -813,224 +811,6 @@
   <p:cSld>
     <p:spTree>
       <p:nvGrpSpPr>
-        <p:cNvPr id="1" name="">
-          <a:extLst>
-            <a:ext uri="{FF2B5EF4-FFF2-40B4-BE49-F238E27FC236}">
-              <a16:creationId xmlns:a16="http://schemas.microsoft.com/office/drawing/2014/main" id="{64E76671-72A5-DEAA-813D-767C0F5DDAF8}"/>
-            </a:ext>
-          </a:extLst>
-        </p:cNvPr>
-        <p:cNvGrpSpPr/>
-        <p:nvPr/>
-      </p:nvGrpSpPr>
-      <p:grpSpPr>
-        <a:xfrm>
-          <a:off x="0" y="0"/>
-          <a:ext cx="0" cy="0"/>
-          <a:chOff x="0" y="0"/>
-          <a:chExt cx="0" cy="0"/>
-        </a:xfrm>
-      </p:grpSpPr>
-      <p:sp>
-        <p:nvSpPr>
-          <p:cNvPr id="2" name="Slide Image Placeholder 1">
-            <a:extLst>
-              <a:ext uri="{FF2B5EF4-FFF2-40B4-BE49-F238E27FC236}">
-                <a16:creationId xmlns:a16="http://schemas.microsoft.com/office/drawing/2014/main" id="{E75F16A7-914D-0C7C-6361-85987DCD5167}"/>
-              </a:ext>
-            </a:extLst>
-          </p:cNvPr>
-          <p:cNvSpPr>
-            <a:spLocks noGrp="1" noRot="1" noChangeAspect="1"/>
-          </p:cNvSpPr>
-          <p:nvPr>
-            <p:ph type="sldImg"/>
-          </p:nvPr>
-        </p:nvSpPr>
-        <p:spPr/>
-      </p:sp>
-      <p:sp>
-        <p:nvSpPr>
-          <p:cNvPr id="3" name="Notes Placeholder 2">
-            <a:extLst>
-              <a:ext uri="{FF2B5EF4-FFF2-40B4-BE49-F238E27FC236}">
-                <a16:creationId xmlns:a16="http://schemas.microsoft.com/office/drawing/2014/main" id="{6052D866-4671-0F66-AE0E-D8E12A29A13F}"/>
-              </a:ext>
-            </a:extLst>
-          </p:cNvPr>
-          <p:cNvSpPr>
-            <a:spLocks noGrp="1"/>
-          </p:cNvSpPr>
-          <p:nvPr>
-            <p:ph type="body" idx="1"/>
-          </p:nvPr>
-        </p:nvSpPr>
-        <p:spPr/>
-        <p:txBody>
-          <a:bodyPr/>
-          <a:lstStyle/>
-          <a:p>
-            <a:endParaRPr lang="en-GB" dirty="0"/>
-          </a:p>
-        </p:txBody>
-      </p:sp>
-      <p:sp>
-        <p:nvSpPr>
-          <p:cNvPr id="4" name="Slide Number Placeholder 3">
-            <a:extLst>
-              <a:ext uri="{FF2B5EF4-FFF2-40B4-BE49-F238E27FC236}">
-                <a16:creationId xmlns:a16="http://schemas.microsoft.com/office/drawing/2014/main" id="{7DC118BE-C647-EB8D-05D2-3C32D3EC1B02}"/>
-              </a:ext>
-            </a:extLst>
-          </p:cNvPr>
-          <p:cNvSpPr>
-            <a:spLocks noGrp="1"/>
-          </p:cNvSpPr>
-          <p:nvPr>
-            <p:ph type="sldNum" sz="quarter" idx="5"/>
-          </p:nvPr>
-        </p:nvSpPr>
-        <p:spPr/>
-        <p:txBody>
-          <a:bodyPr/>
-          <a:lstStyle/>
-          <a:p>
-            <a:pPr rtl="0"/>
-            <a:fld id="{D4B9A9E5-4F7F-4A7D-9DE1-899232329269}" type="slidenum">
-              <a:rPr lang="en-GB" smtClean="0"/>
-              <a:t>10</a:t>
-            </a:fld>
-            <a:endParaRPr lang="en-GB"/>
-          </a:p>
-        </p:txBody>
-      </p:sp>
-    </p:spTree>
-    <p:extLst>
-      <p:ext uri="{BB962C8B-B14F-4D97-AF65-F5344CB8AC3E}">
-        <p14:creationId xmlns:p14="http://schemas.microsoft.com/office/powerpoint/2010/main" val="4235604726"/>
-      </p:ext>
-    </p:extLst>
-  </p:cSld>
-  <p:clrMapOvr>
-    <a:masterClrMapping/>
-  </p:clrMapOvr>
-</p:notes>
-</file>
-
-<file path=ppt/notesSlides/notesSlide11.xml><?xml version="1.0" encoding="utf-8"?>
-<p:notes xmlns:a="http://schemas.openxmlformats.org/drawingml/2006/main" xmlns:r="http://schemas.openxmlformats.org/officeDocument/2006/relationships" xmlns:p="http://schemas.openxmlformats.org/presentationml/2006/main">
-  <p:cSld>
-    <p:spTree>
-      <p:nvGrpSpPr>
-        <p:cNvPr id="1" name="">
-          <a:extLst>
-            <a:ext uri="{FF2B5EF4-FFF2-40B4-BE49-F238E27FC236}">
-              <a16:creationId xmlns:a16="http://schemas.microsoft.com/office/drawing/2014/main" id="{2D6E5DFA-DFAD-9132-1DD6-DCC08503B8B2}"/>
-            </a:ext>
-          </a:extLst>
-        </p:cNvPr>
-        <p:cNvGrpSpPr/>
-        <p:nvPr/>
-      </p:nvGrpSpPr>
-      <p:grpSpPr>
-        <a:xfrm>
-          <a:off x="0" y="0"/>
-          <a:ext cx="0" cy="0"/>
-          <a:chOff x="0" y="0"/>
-          <a:chExt cx="0" cy="0"/>
-        </a:xfrm>
-      </p:grpSpPr>
-      <p:sp>
-        <p:nvSpPr>
-          <p:cNvPr id="2" name="Slide Image Placeholder 1">
-            <a:extLst>
-              <a:ext uri="{FF2B5EF4-FFF2-40B4-BE49-F238E27FC236}">
-                <a16:creationId xmlns:a16="http://schemas.microsoft.com/office/drawing/2014/main" id="{EA309CE0-585A-2530-CFCB-D59130D26667}"/>
-              </a:ext>
-            </a:extLst>
-          </p:cNvPr>
-          <p:cNvSpPr>
-            <a:spLocks noGrp="1" noRot="1" noChangeAspect="1"/>
-          </p:cNvSpPr>
-          <p:nvPr>
-            <p:ph type="sldImg"/>
-          </p:nvPr>
-        </p:nvSpPr>
-        <p:spPr/>
-      </p:sp>
-      <p:sp>
-        <p:nvSpPr>
-          <p:cNvPr id="3" name="Notes Placeholder 2">
-            <a:extLst>
-              <a:ext uri="{FF2B5EF4-FFF2-40B4-BE49-F238E27FC236}">
-                <a16:creationId xmlns:a16="http://schemas.microsoft.com/office/drawing/2014/main" id="{34482E8B-DF2C-3088-7C34-9C54357F49C7}"/>
-              </a:ext>
-            </a:extLst>
-          </p:cNvPr>
-          <p:cNvSpPr>
-            <a:spLocks noGrp="1"/>
-          </p:cNvSpPr>
-          <p:nvPr>
-            <p:ph type="body" idx="1"/>
-          </p:nvPr>
-        </p:nvSpPr>
-        <p:spPr/>
-        <p:txBody>
-          <a:bodyPr/>
-          <a:lstStyle/>
-          <a:p>
-            <a:endParaRPr lang="en-GB" dirty="0"/>
-          </a:p>
-        </p:txBody>
-      </p:sp>
-      <p:sp>
-        <p:nvSpPr>
-          <p:cNvPr id="4" name="Slide Number Placeholder 3">
-            <a:extLst>
-              <a:ext uri="{FF2B5EF4-FFF2-40B4-BE49-F238E27FC236}">
-                <a16:creationId xmlns:a16="http://schemas.microsoft.com/office/drawing/2014/main" id="{10F290E1-03AE-4A7E-70AC-9E49ACD7C259}"/>
-              </a:ext>
-            </a:extLst>
-          </p:cNvPr>
-          <p:cNvSpPr>
-            <a:spLocks noGrp="1"/>
-          </p:cNvSpPr>
-          <p:nvPr>
-            <p:ph type="sldNum" sz="quarter" idx="5"/>
-          </p:nvPr>
-        </p:nvSpPr>
-        <p:spPr/>
-        <p:txBody>
-          <a:bodyPr/>
-          <a:lstStyle/>
-          <a:p>
-            <a:pPr rtl="0"/>
-            <a:fld id="{D4B9A9E5-4F7F-4A7D-9DE1-899232329269}" type="slidenum">
-              <a:rPr lang="en-GB" smtClean="0"/>
-              <a:t>11</a:t>
-            </a:fld>
-            <a:endParaRPr lang="en-GB"/>
-          </a:p>
-        </p:txBody>
-      </p:sp>
-    </p:spTree>
-    <p:extLst>
-      <p:ext uri="{BB962C8B-B14F-4D97-AF65-F5344CB8AC3E}">
-        <p14:creationId xmlns:p14="http://schemas.microsoft.com/office/powerpoint/2010/main" val="3774989527"/>
-      </p:ext>
-    </p:extLst>
-  </p:cSld>
-  <p:clrMapOvr>
-    <a:masterClrMapping/>
-  </p:clrMapOvr>
-</p:notes>
-</file>
-
-<file path=ppt/notesSlides/notesSlide12.xml><?xml version="1.0" encoding="utf-8"?>
-<p:notes xmlns:a="http://schemas.openxmlformats.org/drawingml/2006/main" xmlns:r="http://schemas.openxmlformats.org/officeDocument/2006/relationships" xmlns:p="http://schemas.openxmlformats.org/presentationml/2006/main">
-  <p:cSld>
-    <p:spTree>
-      <p:nvGrpSpPr>
         <p:cNvPr id="1" name=""/>
         <p:cNvGrpSpPr/>
         <p:nvPr/>
@@ -1092,7 +872,7 @@
             <a:pPr rtl="0"/>
             <a:fld id="{D4B9A9E5-4F7F-4A7D-9DE1-899232329269}" type="slidenum">
               <a:rPr lang="en-GB" smtClean="0"/>
-              <a:t>12</a:t>
+              <a:t>10</a:t>
             </a:fld>
             <a:endParaRPr lang="en-GB"/>
           </a:p>
@@ -1751,153 +1531,6 @@
   <p:cSld>
     <p:spTree>
       <p:nvGrpSpPr>
-        <p:cNvPr id="1" name=""/>
-        <p:cNvGrpSpPr/>
-        <p:nvPr/>
-      </p:nvGrpSpPr>
-      <p:grpSpPr>
-        <a:xfrm>
-          <a:off x="0" y="0"/>
-          <a:ext cx="0" cy="0"/>
-          <a:chOff x="0" y="0"/>
-          <a:chExt cx="0" cy="0"/>
-        </a:xfrm>
-      </p:grpSpPr>
-      <p:sp>
-        <p:nvSpPr>
-          <p:cNvPr id="2" name="Slide Image Placeholder 1"/>
-          <p:cNvSpPr>
-            <a:spLocks noGrp="1" noRot="1" noChangeAspect="1"/>
-          </p:cNvSpPr>
-          <p:nvPr>
-            <p:ph type="sldImg"/>
-          </p:nvPr>
-        </p:nvSpPr>
-        <p:spPr/>
-      </p:sp>
-      <p:sp>
-        <p:nvSpPr>
-          <p:cNvPr id="3" name="Notes Placeholder 2"/>
-          <p:cNvSpPr>
-            <a:spLocks noGrp="1"/>
-          </p:cNvSpPr>
-          <p:nvPr>
-            <p:ph type="body" idx="1"/>
-          </p:nvPr>
-        </p:nvSpPr>
-        <p:spPr/>
-        <p:txBody>
-          <a:bodyPr/>
-          <a:lstStyle/>
-          <a:p>
-            <a:r>
-              <a:rPr lang="en-GB" dirty="0"/>
-              <a:t>The </a:t>
-            </a:r>
-            <a:r>
-              <a:rPr lang="en-GB" b="1" dirty="0"/>
-              <a:t>key challenge</a:t>
-            </a:r>
-            <a:r>
-              <a:rPr lang="en-GB" dirty="0"/>
-              <a:t> in this project is achieving a </a:t>
-            </a:r>
-            <a:r>
-              <a:rPr lang="en-GB" b="1" dirty="0"/>
-              <a:t>balance between accuracy, power, and speed</a:t>
-            </a:r>
-            <a:r>
-              <a:rPr lang="en-GB" dirty="0"/>
-              <a:t>.</a:t>
-            </a:r>
-          </a:p>
-          <a:p>
-            <a:r>
-              <a:rPr lang="en-GB" dirty="0"/>
-              <a:t>To address this, we implemented:</a:t>
-            </a:r>
-            <a:br>
-              <a:rPr lang="en-GB" dirty="0"/>
-            </a:br>
-            <a:r>
-              <a:rPr lang="en-GB" b="1" dirty="0"/>
-              <a:t>Approximate Adders and Multipliers</a:t>
-            </a:r>
-            <a:r>
-              <a:rPr lang="en-GB" dirty="0"/>
-              <a:t> based on existing research</a:t>
-            </a:r>
-            <a:br>
-              <a:rPr lang="en-GB" dirty="0"/>
-            </a:br>
-            <a:r>
-              <a:rPr lang="en-GB" b="1" dirty="0"/>
-              <a:t>Verilog for implementation</a:t>
-            </a:r>
-            <a:r>
-              <a:rPr lang="en-GB" dirty="0"/>
-              <a:t> and </a:t>
-            </a:r>
-            <a:r>
-              <a:rPr lang="en-GB" b="1" dirty="0"/>
-              <a:t>FPGA-based simulations</a:t>
-            </a:r>
-            <a:br>
-              <a:rPr lang="en-GB" dirty="0"/>
-            </a:br>
-            <a:r>
-              <a:rPr lang="en-GB" b="1" dirty="0"/>
-              <a:t>Performance evaluations</a:t>
-            </a:r>
-            <a:r>
-              <a:rPr lang="en-GB" dirty="0"/>
-              <a:t> to compare with traditional MAC units</a:t>
-            </a:r>
-          </a:p>
-        </p:txBody>
-      </p:sp>
-      <p:sp>
-        <p:nvSpPr>
-          <p:cNvPr id="4" name="Slide Number Placeholder 3"/>
-          <p:cNvSpPr>
-            <a:spLocks noGrp="1"/>
-          </p:cNvSpPr>
-          <p:nvPr>
-            <p:ph type="sldNum" sz="quarter" idx="5"/>
-          </p:nvPr>
-        </p:nvSpPr>
-        <p:spPr/>
-        <p:txBody>
-          <a:bodyPr/>
-          <a:lstStyle/>
-          <a:p>
-            <a:pPr rtl="0"/>
-            <a:fld id="{D4B9A9E5-4F7F-4A7D-9DE1-899232329269}" type="slidenum">
-              <a:rPr lang="en-GB" smtClean="0"/>
-              <a:t>6</a:t>
-            </a:fld>
-            <a:endParaRPr lang="en-GB"/>
-          </a:p>
-        </p:txBody>
-      </p:sp>
-    </p:spTree>
-    <p:extLst>
-      <p:ext uri="{BB962C8B-B14F-4D97-AF65-F5344CB8AC3E}">
-        <p14:creationId xmlns:p14="http://schemas.microsoft.com/office/powerpoint/2010/main" val="2063318680"/>
-      </p:ext>
-    </p:extLst>
-  </p:cSld>
-  <p:clrMapOvr>
-    <a:masterClrMapping/>
-  </p:clrMapOvr>
-</p:notes>
-</file>
-
-<file path=ppt/notesSlides/notesSlide7.xml><?xml version="1.0" encoding="utf-8"?>
-<p:notes xmlns:a="http://schemas.openxmlformats.org/drawingml/2006/main" xmlns:r="http://schemas.openxmlformats.org/officeDocument/2006/relationships" xmlns:p="http://schemas.openxmlformats.org/presentationml/2006/main">
-  <p:cSld>
-    <p:spTree>
-      <p:nvGrpSpPr>
         <p:cNvPr id="1" name="">
           <a:extLst>
             <a:ext uri="{FF2B5EF4-FFF2-40B4-BE49-F238E27FC236}">
@@ -2091,7 +1724,7 @@
             <a:pPr rtl="0"/>
             <a:fld id="{D4B9A9E5-4F7F-4A7D-9DE1-899232329269}" type="slidenum">
               <a:rPr lang="en-GB" smtClean="0"/>
-              <a:t>7</a:t>
+              <a:t>6</a:t>
             </a:fld>
             <a:endParaRPr lang="en-GB"/>
           </a:p>
@@ -2110,7 +1743,7 @@
 </p:notes>
 </file>
 
-<file path=ppt/notesSlides/notesSlide8.xml><?xml version="1.0" encoding="utf-8"?>
+<file path=ppt/notesSlides/notesSlide7.xml><?xml version="1.0" encoding="utf-8"?>
 <p:notes xmlns:a="http://schemas.openxmlformats.org/drawingml/2006/main" xmlns:r="http://schemas.openxmlformats.org/officeDocument/2006/relationships" xmlns:p="http://schemas.openxmlformats.org/presentationml/2006/main">
   <p:cSld>
     <p:spTree>
@@ -2207,7 +1840,7 @@
             <a:pPr rtl="0"/>
             <a:fld id="{D4B9A9E5-4F7F-4A7D-9DE1-899232329269}" type="slidenum">
               <a:rPr lang="en-GB" smtClean="0"/>
-              <a:t>8</a:t>
+              <a:t>7</a:t>
             </a:fld>
             <a:endParaRPr lang="en-GB"/>
           </a:p>
@@ -2226,7 +1859,7 @@
 </p:notes>
 </file>
 
-<file path=ppt/notesSlides/notesSlide9.xml><?xml version="1.0" encoding="utf-8"?>
+<file path=ppt/notesSlides/notesSlide8.xml><?xml version="1.0" encoding="utf-8"?>
 <p:notes xmlns:a="http://schemas.openxmlformats.org/drawingml/2006/main" xmlns:r="http://schemas.openxmlformats.org/officeDocument/2006/relationships" xmlns:p="http://schemas.openxmlformats.org/presentationml/2006/main">
   <p:cSld>
     <p:spTree>
@@ -2316,7 +1949,7 @@
             <a:pPr rtl="0"/>
             <a:fld id="{D4B9A9E5-4F7F-4A7D-9DE1-899232329269}" type="slidenum">
               <a:rPr lang="en-GB" smtClean="0"/>
-              <a:t>9</a:t>
+              <a:t>8</a:t>
             </a:fld>
             <a:endParaRPr lang="en-GB"/>
           </a:p>
@@ -2326,6 +1959,115 @@
     <p:extLst>
       <p:ext uri="{BB962C8B-B14F-4D97-AF65-F5344CB8AC3E}">
         <p14:creationId xmlns:p14="http://schemas.microsoft.com/office/powerpoint/2010/main" val="272319258"/>
+      </p:ext>
+    </p:extLst>
+  </p:cSld>
+  <p:clrMapOvr>
+    <a:masterClrMapping/>
+  </p:clrMapOvr>
+</p:notes>
+</file>
+
+<file path=ppt/notesSlides/notesSlide9.xml><?xml version="1.0" encoding="utf-8"?>
+<p:notes xmlns:a="http://schemas.openxmlformats.org/drawingml/2006/main" xmlns:r="http://schemas.openxmlformats.org/officeDocument/2006/relationships" xmlns:p="http://schemas.openxmlformats.org/presentationml/2006/main">
+  <p:cSld>
+    <p:spTree>
+      <p:nvGrpSpPr>
+        <p:cNvPr id="1" name="">
+          <a:extLst>
+            <a:ext uri="{FF2B5EF4-FFF2-40B4-BE49-F238E27FC236}">
+              <a16:creationId xmlns:a16="http://schemas.microsoft.com/office/drawing/2014/main" id="{64E76671-72A5-DEAA-813D-767C0F5DDAF8}"/>
+            </a:ext>
+          </a:extLst>
+        </p:cNvPr>
+        <p:cNvGrpSpPr/>
+        <p:nvPr/>
+      </p:nvGrpSpPr>
+      <p:grpSpPr>
+        <a:xfrm>
+          <a:off x="0" y="0"/>
+          <a:ext cx="0" cy="0"/>
+          <a:chOff x="0" y="0"/>
+          <a:chExt cx="0" cy="0"/>
+        </a:xfrm>
+      </p:grpSpPr>
+      <p:sp>
+        <p:nvSpPr>
+          <p:cNvPr id="2" name="Slide Image Placeholder 1">
+            <a:extLst>
+              <a:ext uri="{FF2B5EF4-FFF2-40B4-BE49-F238E27FC236}">
+                <a16:creationId xmlns:a16="http://schemas.microsoft.com/office/drawing/2014/main" id="{E75F16A7-914D-0C7C-6361-85987DCD5167}"/>
+              </a:ext>
+            </a:extLst>
+          </p:cNvPr>
+          <p:cNvSpPr>
+            <a:spLocks noGrp="1" noRot="1" noChangeAspect="1"/>
+          </p:cNvSpPr>
+          <p:nvPr>
+            <p:ph type="sldImg"/>
+          </p:nvPr>
+        </p:nvSpPr>
+        <p:spPr/>
+      </p:sp>
+      <p:sp>
+        <p:nvSpPr>
+          <p:cNvPr id="3" name="Notes Placeholder 2">
+            <a:extLst>
+              <a:ext uri="{FF2B5EF4-FFF2-40B4-BE49-F238E27FC236}">
+                <a16:creationId xmlns:a16="http://schemas.microsoft.com/office/drawing/2014/main" id="{6052D866-4671-0F66-AE0E-D8E12A29A13F}"/>
+              </a:ext>
+            </a:extLst>
+          </p:cNvPr>
+          <p:cNvSpPr>
+            <a:spLocks noGrp="1"/>
+          </p:cNvSpPr>
+          <p:nvPr>
+            <p:ph type="body" idx="1"/>
+          </p:nvPr>
+        </p:nvSpPr>
+        <p:spPr/>
+        <p:txBody>
+          <a:bodyPr/>
+          <a:lstStyle/>
+          <a:p>
+            <a:endParaRPr lang="en-GB" dirty="0"/>
+          </a:p>
+        </p:txBody>
+      </p:sp>
+      <p:sp>
+        <p:nvSpPr>
+          <p:cNvPr id="4" name="Slide Number Placeholder 3">
+            <a:extLst>
+              <a:ext uri="{FF2B5EF4-FFF2-40B4-BE49-F238E27FC236}">
+                <a16:creationId xmlns:a16="http://schemas.microsoft.com/office/drawing/2014/main" id="{7DC118BE-C647-EB8D-05D2-3C32D3EC1B02}"/>
+              </a:ext>
+            </a:extLst>
+          </p:cNvPr>
+          <p:cNvSpPr>
+            <a:spLocks noGrp="1"/>
+          </p:cNvSpPr>
+          <p:nvPr>
+            <p:ph type="sldNum" sz="quarter" idx="5"/>
+          </p:nvPr>
+        </p:nvSpPr>
+        <p:spPr/>
+        <p:txBody>
+          <a:bodyPr/>
+          <a:lstStyle/>
+          <a:p>
+            <a:pPr rtl="0"/>
+            <a:fld id="{D4B9A9E5-4F7F-4A7D-9DE1-899232329269}" type="slidenum">
+              <a:rPr lang="en-GB" smtClean="0"/>
+              <a:t>9</a:t>
+            </a:fld>
+            <a:endParaRPr lang="en-GB"/>
+          </a:p>
+        </p:txBody>
+      </p:sp>
+    </p:spTree>
+    <p:extLst>
+      <p:ext uri="{BB962C8B-B14F-4D97-AF65-F5344CB8AC3E}">
+        <p14:creationId xmlns:p14="http://schemas.microsoft.com/office/powerpoint/2010/main" val="4235604726"/>
       </p:ext>
     </p:extLst>
   </p:cSld>
@@ -17250,7 +16992,7 @@
             <a:pPr rtl="0"/>
             <a:r>
               <a:rPr lang="en-US" dirty="0"/>
-              <a:t>Public engagement activity</a:t>
+              <a:t>Symposium</a:t>
             </a:r>
             <a:endParaRPr lang="en-GB" dirty="0"/>
           </a:p>
@@ -17346,411 +17088,6 @@
     </p:bg>
     <p:spTree>
       <p:nvGrpSpPr>
-        <p:cNvPr id="1" name="">
-          <a:extLst>
-            <a:ext uri="{FF2B5EF4-FFF2-40B4-BE49-F238E27FC236}">
-              <a16:creationId xmlns:a16="http://schemas.microsoft.com/office/drawing/2014/main" id="{0123FABB-3156-19E0-34B5-36241A5EB0EC}"/>
-            </a:ext>
-          </a:extLst>
-        </p:cNvPr>
-        <p:cNvGrpSpPr/>
-        <p:nvPr/>
-      </p:nvGrpSpPr>
-      <p:grpSpPr>
-        <a:xfrm>
-          <a:off x="0" y="0"/>
-          <a:ext cx="0" cy="0"/>
-          <a:chOff x="0" y="0"/>
-          <a:chExt cx="0" cy="0"/>
-        </a:xfrm>
-      </p:grpSpPr>
-      <p:pic>
-        <p:nvPicPr>
-          <p:cNvPr id="6" name="Picture 5">
-            <a:extLst>
-              <a:ext uri="{FF2B5EF4-FFF2-40B4-BE49-F238E27FC236}">
-                <a16:creationId xmlns:a16="http://schemas.microsoft.com/office/drawing/2014/main" id="{F1135473-FD36-2CB3-70F9-6BDA0992AC45}"/>
-              </a:ext>
-            </a:extLst>
-          </p:cNvPr>
-          <p:cNvPicPr>
-            <a:picLocks noChangeAspect="1"/>
-          </p:cNvPicPr>
-          <p:nvPr/>
-        </p:nvPicPr>
-        <p:blipFill>
-          <a:blip r:embed="rId3"/>
-          <a:stretch>
-            <a:fillRect/>
-          </a:stretch>
-        </p:blipFill>
-        <p:spPr>
-          <a:xfrm>
-            <a:off x="65368" y="1132719"/>
-            <a:ext cx="5339491" cy="5682907"/>
-          </a:xfrm>
-          <a:prstGeom prst="rect">
-            <a:avLst/>
-          </a:prstGeom>
-        </p:spPr>
-      </p:pic>
-      <p:sp>
-        <p:nvSpPr>
-          <p:cNvPr id="2" name="Title 1">
-            <a:extLst>
-              <a:ext uri="{FF2B5EF4-FFF2-40B4-BE49-F238E27FC236}">
-                <a16:creationId xmlns:a16="http://schemas.microsoft.com/office/drawing/2014/main" id="{E19C496A-CE83-B5EB-2C9B-03DDECAEB53C}"/>
-              </a:ext>
-            </a:extLst>
-          </p:cNvPr>
-          <p:cNvSpPr>
-            <a:spLocks noGrp="1"/>
-          </p:cNvSpPr>
-          <p:nvPr>
-            <p:ph type="ctrTitle"/>
-          </p:nvPr>
-        </p:nvSpPr>
-        <p:spPr>
-          <a:xfrm>
-            <a:off x="6675960" y="1619260"/>
-            <a:ext cx="5063801" cy="1715531"/>
-          </a:xfrm>
-        </p:spPr>
-        <p:txBody>
-          <a:bodyPr rtlCol="0"/>
-          <a:lstStyle/>
-          <a:p>
-            <a:pPr rtl="0"/>
-            <a:r>
-              <a:rPr lang="en-GB" dirty="0">
-                <a:solidFill>
-                  <a:schemeClr val="tx1"/>
-                </a:solidFill>
-              </a:rPr>
-              <a:t>SIMULATION RESULTS - Multiplier</a:t>
-            </a:r>
-          </a:p>
-        </p:txBody>
-      </p:sp>
-      <p:sp>
-        <p:nvSpPr>
-          <p:cNvPr id="4" name="Slide Number Placeholder 5">
-            <a:extLst>
-              <a:ext uri="{FF2B5EF4-FFF2-40B4-BE49-F238E27FC236}">
-                <a16:creationId xmlns:a16="http://schemas.microsoft.com/office/drawing/2014/main" id="{17C511B7-38D9-A586-7FE5-5B08538DD8E4}"/>
-              </a:ext>
-            </a:extLst>
-          </p:cNvPr>
-          <p:cNvSpPr txBox="1">
-            <a:spLocks/>
-          </p:cNvSpPr>
-          <p:nvPr/>
-        </p:nvSpPr>
-        <p:spPr>
-          <a:xfrm>
-            <a:off x="8610600" y="6356350"/>
-            <a:ext cx="2743200" cy="365125"/>
-          </a:xfrm>
-          <a:prstGeom prst="rect">
-            <a:avLst/>
-          </a:prstGeom>
-        </p:spPr>
-        <p:txBody>
-          <a:bodyPr rtlCol="0"/>
-          <a:lstStyle>
-            <a:defPPr rtl="0">
-              <a:defRPr lang="en-GB"/>
-            </a:defPPr>
-            <a:lvl1pPr marL="0" algn="l" defTabSz="914400" rtl="0" eaLnBrk="1" latinLnBrk="0" hangingPunct="1">
-              <a:defRPr sz="1800" kern="1200">
-                <a:solidFill>
-                  <a:schemeClr val="tx1"/>
-                </a:solidFill>
-                <a:latin typeface="+mn-lt"/>
-                <a:ea typeface="+mn-ea"/>
-                <a:cs typeface="+mn-cs"/>
-              </a:defRPr>
-            </a:lvl1pPr>
-            <a:lvl2pPr marL="457200" algn="l" defTabSz="914400" rtl="0" eaLnBrk="1" latinLnBrk="0" hangingPunct="1">
-              <a:defRPr sz="1800" kern="1200">
-                <a:solidFill>
-                  <a:schemeClr val="tx1"/>
-                </a:solidFill>
-                <a:latin typeface="+mn-lt"/>
-                <a:ea typeface="+mn-ea"/>
-                <a:cs typeface="+mn-cs"/>
-              </a:defRPr>
-            </a:lvl2pPr>
-            <a:lvl3pPr marL="914400" algn="l" defTabSz="914400" rtl="0" eaLnBrk="1" latinLnBrk="0" hangingPunct="1">
-              <a:defRPr sz="1800" kern="1200">
-                <a:solidFill>
-                  <a:schemeClr val="tx1"/>
-                </a:solidFill>
-                <a:latin typeface="+mn-lt"/>
-                <a:ea typeface="+mn-ea"/>
-                <a:cs typeface="+mn-cs"/>
-              </a:defRPr>
-            </a:lvl3pPr>
-            <a:lvl4pPr marL="1371600" algn="l" defTabSz="914400" rtl="0" eaLnBrk="1" latinLnBrk="0" hangingPunct="1">
-              <a:defRPr sz="1800" kern="1200">
-                <a:solidFill>
-                  <a:schemeClr val="tx1"/>
-                </a:solidFill>
-                <a:latin typeface="+mn-lt"/>
-                <a:ea typeface="+mn-ea"/>
-                <a:cs typeface="+mn-cs"/>
-              </a:defRPr>
-            </a:lvl4pPr>
-            <a:lvl5pPr marL="1828800" algn="l" defTabSz="914400" rtl="0" eaLnBrk="1" latinLnBrk="0" hangingPunct="1">
-              <a:defRPr sz="1800" kern="1200">
-                <a:solidFill>
-                  <a:schemeClr val="tx1"/>
-                </a:solidFill>
-                <a:latin typeface="+mn-lt"/>
-                <a:ea typeface="+mn-ea"/>
-                <a:cs typeface="+mn-cs"/>
-              </a:defRPr>
-            </a:lvl5pPr>
-            <a:lvl6pPr marL="2286000" algn="l" defTabSz="914400" rtl="0" eaLnBrk="1" latinLnBrk="0" hangingPunct="1">
-              <a:defRPr sz="1800" kern="1200">
-                <a:solidFill>
-                  <a:schemeClr val="tx1"/>
-                </a:solidFill>
-                <a:latin typeface="+mn-lt"/>
-                <a:ea typeface="+mn-ea"/>
-                <a:cs typeface="+mn-cs"/>
-              </a:defRPr>
-            </a:lvl6pPr>
-            <a:lvl7pPr marL="2743200" algn="l" defTabSz="914400" rtl="0" eaLnBrk="1" latinLnBrk="0" hangingPunct="1">
-              <a:defRPr sz="1800" kern="1200">
-                <a:solidFill>
-                  <a:schemeClr val="tx1"/>
-                </a:solidFill>
-                <a:latin typeface="+mn-lt"/>
-                <a:ea typeface="+mn-ea"/>
-                <a:cs typeface="+mn-cs"/>
-              </a:defRPr>
-            </a:lvl7pPr>
-            <a:lvl8pPr marL="3200400" algn="l" defTabSz="914400" rtl="0" eaLnBrk="1" latinLnBrk="0" hangingPunct="1">
-              <a:defRPr sz="1800" kern="1200">
-                <a:solidFill>
-                  <a:schemeClr val="tx1"/>
-                </a:solidFill>
-                <a:latin typeface="+mn-lt"/>
-                <a:ea typeface="+mn-ea"/>
-                <a:cs typeface="+mn-cs"/>
-              </a:defRPr>
-            </a:lvl8pPr>
-            <a:lvl9pPr marL="3657600" algn="l" defTabSz="914400" rtl="0" eaLnBrk="1" latinLnBrk="0" hangingPunct="1">
-              <a:defRPr sz="1800" kern="1200">
-                <a:solidFill>
-                  <a:schemeClr val="tx1"/>
-                </a:solidFill>
-                <a:latin typeface="+mn-lt"/>
-                <a:ea typeface="+mn-ea"/>
-                <a:cs typeface="+mn-cs"/>
-              </a:defRPr>
-            </a:lvl9pPr>
-          </a:lstStyle>
-          <a:p>
-            <a:pPr algn="r"/>
-            <a:fld id="{B5CEABB6-07DC-46E8-9B57-56EC44A396E5}" type="slidenum">
-              <a:rPr lang="en-GB" sz="900" smtClean="0"/>
-              <a:pPr algn="r"/>
-              <a:t>10</a:t>
-            </a:fld>
-            <a:endParaRPr lang="en-GB" dirty="0"/>
-          </a:p>
-        </p:txBody>
-      </p:sp>
-      <p:pic>
-        <p:nvPicPr>
-          <p:cNvPr id="5" name="Picture 4">
-            <a:extLst>
-              <a:ext uri="{FF2B5EF4-FFF2-40B4-BE49-F238E27FC236}">
-                <a16:creationId xmlns:a16="http://schemas.microsoft.com/office/drawing/2014/main" id="{086190A1-15C5-955E-EE8A-7F174371A61E}"/>
-              </a:ext>
-            </a:extLst>
-          </p:cNvPr>
-          <p:cNvPicPr>
-            <a:picLocks noChangeAspect="1"/>
-          </p:cNvPicPr>
-          <p:nvPr/>
-        </p:nvPicPr>
-        <p:blipFill>
-          <a:blip r:embed="rId4"/>
-          <a:stretch>
-            <a:fillRect/>
-          </a:stretch>
-        </p:blipFill>
-        <p:spPr>
-          <a:xfrm>
-            <a:off x="31376" y="42374"/>
-            <a:ext cx="12129247" cy="982262"/>
-          </a:xfrm>
-          <a:prstGeom prst="rect">
-            <a:avLst/>
-          </a:prstGeom>
-        </p:spPr>
-      </p:pic>
-      <p:pic>
-        <p:nvPicPr>
-          <p:cNvPr id="7" name="Picture 6">
-            <a:extLst>
-              <a:ext uri="{FF2B5EF4-FFF2-40B4-BE49-F238E27FC236}">
-                <a16:creationId xmlns:a16="http://schemas.microsoft.com/office/drawing/2014/main" id="{E7DB5234-806B-E445-8FC5-869EFBC57BF4}"/>
-              </a:ext>
-            </a:extLst>
-          </p:cNvPr>
-          <p:cNvPicPr>
-            <a:picLocks noChangeAspect="1"/>
-          </p:cNvPicPr>
-          <p:nvPr/>
-        </p:nvPicPr>
-        <p:blipFill>
-          <a:blip r:embed="rId5"/>
-          <a:stretch>
-            <a:fillRect/>
-          </a:stretch>
-        </p:blipFill>
-        <p:spPr>
-          <a:xfrm>
-            <a:off x="5614895" y="2961973"/>
-            <a:ext cx="1877714" cy="3853653"/>
-          </a:xfrm>
-          <a:prstGeom prst="rect">
-            <a:avLst/>
-          </a:prstGeom>
-        </p:spPr>
-      </p:pic>
-    </p:spTree>
-    <p:extLst>
-      <p:ext uri="{BB962C8B-B14F-4D97-AF65-F5344CB8AC3E}">
-        <p14:creationId xmlns:p14="http://schemas.microsoft.com/office/powerpoint/2010/main" val="874077177"/>
-      </p:ext>
-    </p:extLst>
-  </p:cSld>
-  <p:clrMapOvr>
-    <a:masterClrMapping/>
-  </p:clrMapOvr>
-</p:sld>
-</file>
-
-<file path=ppt/slides/slide11.xml><?xml version="1.0" encoding="utf-8"?>
-<p:sld xmlns:a="http://schemas.openxmlformats.org/drawingml/2006/main" xmlns:r="http://schemas.openxmlformats.org/officeDocument/2006/relationships" xmlns:p="http://schemas.openxmlformats.org/presentationml/2006/main">
-  <p:cSld>
-    <p:spTree>
-      <p:nvGrpSpPr>
-        <p:cNvPr id="1" name="">
-          <a:extLst>
-            <a:ext uri="{FF2B5EF4-FFF2-40B4-BE49-F238E27FC236}">
-              <a16:creationId xmlns:a16="http://schemas.microsoft.com/office/drawing/2014/main" id="{21E03235-2E12-B2D6-FF12-C0DF019ED511}"/>
-            </a:ext>
-          </a:extLst>
-        </p:cNvPr>
-        <p:cNvGrpSpPr/>
-        <p:nvPr/>
-      </p:nvGrpSpPr>
-      <p:grpSpPr>
-        <a:xfrm>
-          <a:off x="0" y="0"/>
-          <a:ext cx="0" cy="0"/>
-          <a:chOff x="0" y="0"/>
-          <a:chExt cx="0" cy="0"/>
-        </a:xfrm>
-      </p:grpSpPr>
-      <p:pic>
-        <p:nvPicPr>
-          <p:cNvPr id="4" name="Picture 3">
-            <a:extLst>
-              <a:ext uri="{FF2B5EF4-FFF2-40B4-BE49-F238E27FC236}">
-                <a16:creationId xmlns:a16="http://schemas.microsoft.com/office/drawing/2014/main" id="{7990C3BF-2200-CEFF-4B0F-D4B2F1701DFD}"/>
-              </a:ext>
-            </a:extLst>
-          </p:cNvPr>
-          <p:cNvPicPr>
-            <a:picLocks noChangeAspect="1"/>
-          </p:cNvPicPr>
-          <p:nvPr/>
-        </p:nvPicPr>
-        <p:blipFill>
-          <a:blip r:embed="rId3"/>
-          <a:stretch>
-            <a:fillRect/>
-          </a:stretch>
-        </p:blipFill>
-        <p:spPr>
-          <a:xfrm>
-            <a:off x="0" y="5141"/>
-            <a:ext cx="12578862" cy="6852859"/>
-          </a:xfrm>
-          <a:prstGeom prst="rect">
-            <a:avLst/>
-          </a:prstGeom>
-        </p:spPr>
-      </p:pic>
-      <p:sp>
-        <p:nvSpPr>
-          <p:cNvPr id="22" name="Slide Number Placeholder 21">
-            <a:extLst>
-              <a:ext uri="{FF2B5EF4-FFF2-40B4-BE49-F238E27FC236}">
-                <a16:creationId xmlns:a16="http://schemas.microsoft.com/office/drawing/2014/main" id="{15850B96-8188-C18A-5850-E90C83C5D05E}"/>
-              </a:ext>
-            </a:extLst>
-          </p:cNvPr>
-          <p:cNvSpPr>
-            <a:spLocks noGrp="1"/>
-          </p:cNvSpPr>
-          <p:nvPr>
-            <p:ph type="sldNum" sz="quarter" idx="22"/>
-          </p:nvPr>
-        </p:nvSpPr>
-        <p:spPr>
-          <a:xfrm>
-            <a:off x="10700656" y="6356350"/>
-            <a:ext cx="653143" cy="365125"/>
-          </a:xfrm>
-        </p:spPr>
-        <p:txBody>
-          <a:bodyPr rtlCol="0"/>
-          <a:lstStyle/>
-          <a:p>
-            <a:pPr rtl="0"/>
-            <a:fld id="{B5CEABB6-07DC-46E8-9B57-56EC44A396E5}" type="slidenum">
-              <a:rPr lang="en-GB" smtClean="0"/>
-              <a:pPr rtl="0"/>
-              <a:t>11</a:t>
-            </a:fld>
-            <a:endParaRPr lang="en-GB"/>
-          </a:p>
-        </p:txBody>
-      </p:sp>
-    </p:spTree>
-    <p:extLst>
-      <p:ext uri="{BB962C8B-B14F-4D97-AF65-F5344CB8AC3E}">
-        <p14:creationId xmlns:p14="http://schemas.microsoft.com/office/powerpoint/2010/main" val="3345524636"/>
-      </p:ext>
-    </p:extLst>
-  </p:cSld>
-  <p:clrMapOvr>
-    <a:masterClrMapping/>
-  </p:clrMapOvr>
-</p:sld>
-</file>
-
-<file path=ppt/slides/slide12.xml><?xml version="1.0" encoding="utf-8"?>
-<p:sld xmlns:a="http://schemas.openxmlformats.org/drawingml/2006/main" xmlns:r="http://schemas.openxmlformats.org/officeDocument/2006/relationships" xmlns:p="http://schemas.openxmlformats.org/presentationml/2006/main">
-  <p:cSld>
-    <p:bg>
-      <p:bgPr>
-        <a:solidFill>
-          <a:schemeClr val="accent1"/>
-        </a:solidFill>
-        <a:effectLst/>
-      </p:bgPr>
-    </p:bg>
-    <p:spTree>
-      <p:nvGrpSpPr>
         <p:cNvPr id="1" name=""/>
         <p:cNvGrpSpPr/>
         <p:nvPr/>
@@ -17897,7 +17234,7 @@
                 </a:solidFill>
               </a:rPr>
               <a:pPr rtl="0"/>
-              <a:t>12</a:t>
+              <a:t>10</a:t>
             </a:fld>
             <a:endParaRPr lang="en-GB" dirty="0">
               <a:solidFill>
@@ -18052,12 +17389,12 @@
               <a:buChar char="•"/>
             </a:pPr>
             <a:r>
-              <a:rPr lang="en-US" b="1" dirty="0">
+              <a:rPr lang="en-GB" b="1" dirty="0">
                 <a:solidFill>
                   <a:schemeClr val="tx1"/>
                 </a:solidFill>
               </a:rPr>
-              <a:t>Implement an Arithmetic Unit Utilizing Approximate Computing into RISC-V SoC.</a:t>
+              <a:t>Design of an Approximate 8-bit MAC Unit: A Step Towards RISC-V SoC Integration</a:t>
             </a:r>
           </a:p>
           <a:p>
@@ -18874,7 +18211,7 @@
         </p:nvSpPr>
         <p:spPr>
           <a:xfrm>
-            <a:off x="1885156" y="892177"/>
+            <a:off x="1885156" y="441086"/>
             <a:ext cx="8421688" cy="1325563"/>
           </a:xfrm>
         </p:spPr>
@@ -18912,25 +18249,29 @@
         </p:nvSpPr>
         <p:spPr>
           <a:xfrm>
-            <a:off x="1485900" y="2563123"/>
+            <a:off x="1485899" y="1884835"/>
             <a:ext cx="4031945" cy="365125"/>
           </a:xfrm>
         </p:spPr>
         <p:txBody>
           <a:bodyPr vert="horz" lIns="91440" tIns="45720" rIns="91440" bIns="45720" rtlCol="0" anchor="t">
-            <a:normAutofit lnSpcReduction="10000"/>
+            <a:noAutofit/>
           </a:bodyPr>
           <a:lstStyle/>
           <a:p>
-            <a:pPr rtl="0"/>
-            <a:r>
-              <a:rPr lang="en-GB" b="1" dirty="0">
+            <a:r>
+              <a:rPr lang="en-US" b="1" dirty="0">
                 <a:solidFill>
                   <a:schemeClr val="tx1"/>
                 </a:solidFill>
               </a:rPr>
-              <a:t>Energy-Efficiency</a:t>
-            </a:r>
+              <a:t>Big Data/Real-Time Processing</a:t>
+            </a:r>
+            <a:endParaRPr lang="en-GB" b="1" dirty="0">
+              <a:solidFill>
+                <a:schemeClr val="tx1"/>
+              </a:solidFill>
+            </a:endParaRPr>
           </a:p>
         </p:txBody>
       </p:sp>
@@ -18952,41 +18293,34 @@
         </p:nvSpPr>
         <p:spPr>
           <a:xfrm>
-            <a:off x="6673004" y="2563123"/>
+            <a:off x="6672629" y="1884834"/>
             <a:ext cx="4031945" cy="365125"/>
           </a:xfrm>
         </p:spPr>
         <p:txBody>
           <a:bodyPr rtlCol="0">
-            <a:normAutofit lnSpcReduction="10000"/>
+            <a:normAutofit fontScale="92500" lnSpcReduction="10000"/>
           </a:bodyPr>
           <a:lstStyle/>
           <a:p>
-            <a:pPr rtl="0"/>
-            <a:r>
-              <a:rPr lang="en-GB" b="1" dirty="0">
+            <a:pPr>
+              <a:lnSpc>
+                <a:spcPct val="100000"/>
+              </a:lnSpc>
+            </a:pPr>
+            <a:r>
+              <a:rPr lang="en-US" b="1" dirty="0">
                 <a:solidFill>
                   <a:schemeClr val="tx1"/>
                 </a:solidFill>
               </a:rPr>
-              <a:t>Traditional</a:t>
-            </a:r>
-            <a:r>
-              <a:rPr lang="en-GB" dirty="0">
-                <a:solidFill>
-                  <a:schemeClr val="tx1"/>
-                </a:solidFill>
-              </a:rPr>
-              <a:t> </a:t>
-            </a:r>
-            <a:r>
-              <a:rPr lang="en-GB" b="1" dirty="0">
-                <a:solidFill>
-                  <a:schemeClr val="tx1"/>
-                </a:solidFill>
-              </a:rPr>
-              <a:t>computation</a:t>
-            </a:r>
+              <a:t>High-Performance Computing</a:t>
+            </a:r>
+            <a:endParaRPr lang="en-GB" b="1" dirty="0">
+              <a:solidFill>
+                <a:schemeClr val="tx1"/>
+              </a:solidFill>
+            </a:endParaRPr>
           </a:p>
         </p:txBody>
       </p:sp>
@@ -19008,25 +18342,34 @@
         </p:nvSpPr>
         <p:spPr>
           <a:xfrm>
-            <a:off x="1485899" y="4319431"/>
+            <a:off x="1484984" y="4070136"/>
             <a:ext cx="4031945" cy="365125"/>
           </a:xfrm>
         </p:spPr>
         <p:txBody>
           <a:bodyPr rtlCol="0">
-            <a:normAutofit lnSpcReduction="10000"/>
+            <a:normAutofit fontScale="92500" lnSpcReduction="10000"/>
           </a:bodyPr>
           <a:lstStyle/>
           <a:p>
-            <a:pPr rtl="0"/>
-            <a:r>
-              <a:rPr lang="en-GB" b="1" dirty="0">
+            <a:pPr>
+              <a:lnSpc>
+                <a:spcPct val="100000"/>
+              </a:lnSpc>
+            </a:pPr>
+            <a:r>
+              <a:rPr lang="en-US" b="1" dirty="0">
                 <a:solidFill>
                   <a:schemeClr val="tx1"/>
                 </a:solidFill>
               </a:rPr>
-              <a:t>Approximate computing</a:t>
-            </a:r>
+              <a:t>Fault Tolerance</a:t>
+            </a:r>
+            <a:endParaRPr lang="en-GB" b="1" dirty="0">
+              <a:solidFill>
+                <a:schemeClr val="tx1"/>
+              </a:solidFill>
+            </a:endParaRPr>
           </a:p>
         </p:txBody>
       </p:sp>
@@ -19048,7 +18391,7 @@
         </p:nvSpPr>
         <p:spPr>
           <a:xfrm>
-            <a:off x="6672630" y="4319431"/>
+            <a:off x="6594627" y="4070135"/>
             <a:ext cx="4031945" cy="365125"/>
           </a:xfrm>
         </p:spPr>
@@ -19118,8 +18461,8 @@
         </p:nvSpPr>
         <p:spPr bwMode="auto">
           <a:xfrm>
-            <a:off x="1485901" y="3121810"/>
-            <a:ext cx="4030323" cy="954107"/>
+            <a:off x="1486606" y="2673707"/>
+            <a:ext cx="4030323" cy="738664"/>
           </a:xfrm>
           <a:prstGeom prst="rect">
             <a:avLst/>
@@ -19167,65 +18510,41 @@
           </a:bodyPr>
           <a:lstStyle/>
           <a:p>
-            <a:pPr marL="0" marR="0" lvl="0" indent="0" algn="l" defTabSz="914400" rtl="0" eaLnBrk="0" fontAlgn="base" latinLnBrk="0" hangingPunct="0">
-              <a:lnSpc>
-                <a:spcPct val="100000"/>
-              </a:lnSpc>
+            <a:pPr algn="l" eaLnBrk="0" fontAlgn="base" hangingPunct="0">
               <a:spcBef>
                 <a:spcPct val="0"/>
               </a:spcBef>
               <a:spcAft>
                 <a:spcPct val="0"/>
               </a:spcAft>
-              <a:buClrTx/>
-              <a:buSzTx/>
-              <a:buFontTx/>
-              <a:buChar char="•"/>
-              <a:tabLst/>
             </a:pPr>
             <a:r>
-              <a:rPr kumimoji="0" lang="en-US" altLang="en-US" b="0" i="0" u="none" strike="noStrike" cap="none" normalizeH="0" baseline="0" dirty="0">
-                <a:ln>
-                  <a:noFill/>
-                </a:ln>
+              <a:rPr lang="en-GB" dirty="0">
                 <a:solidFill>
                   <a:schemeClr val="tx1"/>
                 </a:solidFill>
-                <a:effectLst/>
                 <a:latin typeface="Tenorite (Body)"/>
               </a:rPr>
-              <a:t> Reduced power consumption by allowing controlled errors</a:t>
-            </a:r>
-          </a:p>
-          <a:p>
-            <a:pPr marL="0" marR="0" lvl="0" indent="0" algn="l" defTabSz="914400" rtl="0" eaLnBrk="0" fontAlgn="base" latinLnBrk="0" hangingPunct="0">
-              <a:lnSpc>
-                <a:spcPct val="100000"/>
-              </a:lnSpc>
+              <a:t>Improves scalability</a:t>
+            </a:r>
+          </a:p>
+          <a:p>
+            <a:pPr algn="l" eaLnBrk="0" fontAlgn="base" hangingPunct="0">
               <a:spcBef>
                 <a:spcPct val="0"/>
               </a:spcBef>
               <a:spcAft>
                 <a:spcPct val="0"/>
               </a:spcAft>
-              <a:buClrTx/>
-              <a:buSzTx/>
-              <a:buFontTx/>
-              <a:buChar char="•"/>
-              <a:tabLst/>
             </a:pPr>
             <a:r>
-              <a:rPr kumimoji="0" lang="en-US" altLang="en-US" b="0" i="0" u="none" strike="noStrike" cap="none" normalizeH="0" baseline="0" dirty="0">
-                <a:ln>
-                  <a:noFill/>
-                </a:ln>
+              <a:rPr lang="en-GB" dirty="0">
                 <a:solidFill>
                   <a:schemeClr val="tx1"/>
                 </a:solidFill>
-                <a:effectLst/>
                 <a:latin typeface="Tenorite (Body)"/>
               </a:rPr>
-              <a:t> Lower energy requirements make it suitable for battery-powered devices</a:t>
+              <a:t>Processing speed for real-time data streams (e.g., social media, sensor networks)</a:t>
             </a:r>
           </a:p>
         </p:txBody>
@@ -19248,7 +18567,7 @@
         </p:nvSpPr>
         <p:spPr bwMode="auto">
           <a:xfrm>
-            <a:off x="6674252" y="3121810"/>
+            <a:off x="6672629" y="2673707"/>
             <a:ext cx="4030323" cy="738664"/>
           </a:xfrm>
           <a:prstGeom prst="rect">
@@ -19297,10 +18616,7 @@
           </a:bodyPr>
           <a:lstStyle/>
           <a:p>
-            <a:pPr marL="0" marR="0" lvl="0" indent="0" algn="l" defTabSz="914400" rtl="0" eaLnBrk="0" fontAlgn="base" latinLnBrk="0" hangingPunct="0">
-              <a:lnSpc>
-                <a:spcPct val="100000"/>
-              </a:lnSpc>
+            <a:pPr marR="0" lvl="0" algn="l" eaLnBrk="0" fontAlgn="base" hangingPunct="0">
               <a:spcBef>
                 <a:spcPct val="0"/>
               </a:spcBef>
@@ -19309,29 +18625,20 @@
               </a:spcAft>
               <a:buClrTx/>
               <a:buSzTx/>
-              <a:buFontTx/>
-              <a:buChar char="•"/>
               <a:tabLst/>
             </a:pPr>
             <a:r>
-              <a:rPr kumimoji="0" lang="en-US" altLang="en-US" b="0" i="0" u="none" strike="noStrike" cap="none" normalizeH="0" baseline="0" dirty="0">
-                <a:ln>
-                  <a:noFill/>
-                </a:ln>
+              <a:rPr lang="en-GB" dirty="0">
                 <a:solidFill>
                   <a:schemeClr val="tx1"/>
                 </a:solidFill>
-                <a:effectLst/>
                 <a:latin typeface="Tenorite (Body)"/>
               </a:rPr>
-              <a:t> Precise arithmetic units consume more power and area</a:t>
-            </a:r>
-          </a:p>
-          <a:p>
-            <a:pPr marL="0" marR="0" lvl="0" indent="0" algn="l" defTabSz="914400" rtl="0" eaLnBrk="0" fontAlgn="base" latinLnBrk="0" hangingPunct="0">
-              <a:lnSpc>
-                <a:spcPct val="100000"/>
-              </a:lnSpc>
+              <a:t>Speeds up resource-intensive simulations</a:t>
+            </a:r>
+          </a:p>
+          <a:p>
+            <a:pPr marR="0" lvl="0" algn="l" eaLnBrk="0" fontAlgn="base" hangingPunct="0">
               <a:spcBef>
                 <a:spcPct val="0"/>
               </a:spcBef>
@@ -19340,23 +18647,23 @@
               </a:spcAft>
               <a:buClrTx/>
               <a:buSzTx/>
-              <a:buFontTx/>
-              <a:buChar char="•"/>
               <a:tabLst/>
             </a:pPr>
             <a:r>
-              <a:rPr kumimoji="0" lang="en-US" altLang="en-US" b="0" i="0" u="none" strike="noStrike" cap="none" normalizeH="0" baseline="0" dirty="0">
-                <a:ln>
-                  <a:noFill/>
-                </a:ln>
+              <a:rPr lang="en-GB" dirty="0">
                 <a:solidFill>
                   <a:schemeClr val="tx1"/>
                 </a:solidFill>
-                <a:effectLst/>
                 <a:latin typeface="Tenorite (Body)"/>
               </a:rPr>
-              <a:t> High accuracy but less energy-efficient</a:t>
-            </a:r>
+              <a:t>Data processing, trading some precision for faster performance and lower power usage.</a:t>
+            </a:r>
+            <a:endParaRPr lang="en-US" altLang="en-US" dirty="0">
+              <a:solidFill>
+                <a:schemeClr val="tx1"/>
+              </a:solidFill>
+              <a:latin typeface="Tenorite (Body)"/>
+            </a:endParaRPr>
           </a:p>
         </p:txBody>
       </p:sp>
@@ -19378,8 +18685,8 @@
         </p:nvSpPr>
         <p:spPr bwMode="auto">
           <a:xfrm>
-            <a:off x="1485899" y="4877584"/>
-            <a:ext cx="4031030" cy="954107"/>
+            <a:off x="1484984" y="4601605"/>
+            <a:ext cx="4031030" cy="738664"/>
           </a:xfrm>
           <a:prstGeom prst="rect">
             <a:avLst/>
@@ -19427,64 +18734,29 @@
           </a:bodyPr>
           <a:lstStyle/>
           <a:p>
-            <a:pPr marL="0" marR="0" lvl="0" indent="0" algn="l" defTabSz="914400" rtl="0" eaLnBrk="0" fontAlgn="base" latinLnBrk="0" hangingPunct="0">
-              <a:lnSpc>
-                <a:spcPct val="100000"/>
-              </a:lnSpc>
+            <a:pPr algn="l" eaLnBrk="0" fontAlgn="base" hangingPunct="0">
               <a:spcBef>
                 <a:spcPct val="0"/>
               </a:spcBef>
               <a:spcAft>
                 <a:spcPct val="0"/>
               </a:spcAft>
-              <a:buClrTx/>
-              <a:buSzTx/>
-              <a:buFontTx/>
-              <a:buChar char="•"/>
-              <a:tabLst/>
             </a:pPr>
             <a:r>
-              <a:rPr kumimoji="0" lang="en-US" altLang="en-US" b="0" i="0" u="none" strike="noStrike" cap="none" normalizeH="0" baseline="0" dirty="0">
-                <a:ln>
-                  <a:noFill/>
-                </a:ln>
+              <a:rPr lang="en-GB" dirty="0">
                 <a:solidFill>
                   <a:schemeClr val="tx1"/>
                 </a:solidFill>
-                <a:effectLst/>
+                <a:latin typeface="Tenorite (Body)"/>
               </a:rPr>
-              <a:t> Trades off accuracy for efficiency, reducing power and area</a:t>
-            </a:r>
-          </a:p>
-          <a:p>
-            <a:pPr marL="0" marR="0" lvl="0" indent="0" algn="l" defTabSz="914400" rtl="0" eaLnBrk="0" fontAlgn="base" latinLnBrk="0" hangingPunct="0">
-              <a:lnSpc>
-                <a:spcPct val="100000"/>
-              </a:lnSpc>
-              <a:spcBef>
-                <a:spcPct val="0"/>
-              </a:spcBef>
-              <a:spcAft>
-                <a:spcPct val="0"/>
-              </a:spcAft>
-              <a:buClrTx/>
-              <a:buSzTx/>
-              <a:buFontTx/>
-              <a:buChar char="•"/>
-              <a:tabLst/>
-            </a:pPr>
-            <a:r>
-              <a:rPr kumimoji="0" lang="en-US" altLang="en-US" b="0" i="0" u="none" strike="noStrike" cap="none" normalizeH="0" baseline="0" dirty="0">
-                <a:ln>
-                  <a:noFill/>
-                </a:ln>
-                <a:solidFill>
-                  <a:schemeClr val="tx1"/>
-                </a:solidFill>
-                <a:effectLst/>
-              </a:rPr>
-              <a:t> Suitable for error-tolerant applications like image processing and AI</a:t>
-            </a:r>
+              <a:t>Improves system reliability by allowing for approximate results during faults or hardware failures</a:t>
+            </a:r>
+            <a:endParaRPr lang="en-US" altLang="en-US" dirty="0">
+              <a:solidFill>
+                <a:schemeClr val="tx1"/>
+              </a:solidFill>
+              <a:latin typeface="Tenorite (Body)"/>
+            </a:endParaRPr>
           </a:p>
         </p:txBody>
       </p:sp>
@@ -19506,7 +18778,7 @@
         </p:nvSpPr>
         <p:spPr bwMode="auto">
           <a:xfrm>
-            <a:off x="6672629" y="4882325"/>
+            <a:off x="6672629" y="4601605"/>
             <a:ext cx="3634215" cy="738664"/>
           </a:xfrm>
           <a:prstGeom prst="rect">
@@ -19567,21 +18839,16 @@
               </a:spcAft>
               <a:buClrTx/>
               <a:buSzTx/>
-              <a:buFontTx/>
-              <a:buChar char="•"/>
               <a:tabLst/>
             </a:pPr>
             <a:r>
-              <a:rPr kumimoji="0" lang="en-US" altLang="en-US" b="0" i="0" u="none" strike="noStrike" cap="none" normalizeH="0" baseline="0" dirty="0">
-                <a:ln>
-                  <a:noFill/>
-                </a:ln>
+              <a:rPr lang="en-US" altLang="en-US" dirty="0">
                 <a:solidFill>
                   <a:schemeClr val="tx1"/>
                 </a:solidFill>
-                <a:effectLst/>
+                <a:latin typeface="Tenorite (Body)"/>
               </a:rPr>
-              <a:t> Image processing (denoising, compression)</a:t>
+              <a:t>Image processing </a:t>
             </a:r>
           </a:p>
           <a:p>
@@ -19597,21 +18864,16 @@
               </a:spcAft>
               <a:buClrTx/>
               <a:buSzTx/>
-              <a:buFontTx/>
-              <a:buChar char="•"/>
               <a:tabLst/>
             </a:pPr>
             <a:r>
-              <a:rPr kumimoji="0" lang="en-US" altLang="en-US" b="0" i="0" u="none" strike="noStrike" cap="none" normalizeH="0" baseline="0" dirty="0">
-                <a:ln>
-                  <a:noFill/>
-                </a:ln>
+              <a:rPr lang="en-US" altLang="en-US" dirty="0">
                 <a:solidFill>
                   <a:schemeClr val="tx1"/>
                 </a:solidFill>
-                <a:effectLst/>
+                <a:latin typeface="Tenorite (Body)"/>
               </a:rPr>
-              <a:t> Machine learning </a:t>
+              <a:t>Machine learning </a:t>
             </a:r>
           </a:p>
           <a:p>
@@ -19627,8 +18889,6 @@
               </a:spcAft>
               <a:buClrTx/>
               <a:buSzTx/>
-              <a:buFontTx/>
-              <a:buChar char="•"/>
               <a:tabLst/>
             </a:pPr>
             <a:r>
@@ -19636,18 +18896,7 @@
                 <a:solidFill>
                   <a:schemeClr val="tx1"/>
                 </a:solidFill>
-              </a:rPr>
-              <a:t> </a:t>
-            </a:r>
-            <a:r>
-              <a:rPr kumimoji="0" lang="en-US" altLang="en-US" b="0" i="0" u="none" strike="noStrike" cap="none" normalizeH="0" baseline="0" dirty="0">
-                <a:ln>
-                  <a:noFill/>
-                </a:ln>
-                <a:solidFill>
-                  <a:schemeClr val="tx1"/>
-                </a:solidFill>
-                <a:effectLst/>
+                <a:latin typeface="Tenorite (Body)"/>
               </a:rPr>
               <a:t>Signal processing in embedded systems</a:t>
             </a:r>
@@ -19888,15 +19137,18 @@
           </a:bodyPr>
           <a:lstStyle/>
           <a:p>
-            <a:pPr rtl="0"/>
             <a:r>
               <a:rPr lang="en-US" b="1" dirty="0"/>
               <a:t>A</a:t>
             </a:r>
             <a:r>
               <a:rPr lang="en-GB" b="1" dirty="0"/>
-              <a:t>IMS</a:t>
-            </a:r>
+              <a:t>IMS &amp; OBJECTIVES</a:t>
+            </a:r>
+          </a:p>
+          <a:p>
+            <a:pPr rtl="0"/>
+            <a:endParaRPr lang="en-GB" b="1" dirty="0"/>
           </a:p>
         </p:txBody>
       </p:sp>
@@ -19918,8 +19170,8 @@
         </p:nvSpPr>
         <p:spPr>
           <a:xfrm>
-            <a:off x="5920169" y="1250460"/>
-            <a:ext cx="5431971" cy="1824420"/>
+            <a:off x="5920169" y="1250459"/>
+            <a:ext cx="5431971" cy="3156783"/>
           </a:xfrm>
         </p:spPr>
         <p:txBody>
@@ -19944,7 +19196,17 @@
             </a:pPr>
             <a:r>
               <a:rPr lang="en-GB" dirty="0"/>
-              <a:t>Implement an arithmetic unit utilizing approximate computing into a RISC-V SoC</a:t>
+              <a:t>Optimise the arithmetic unit for energy efficiency while maintaining acceptable computational accuracy.</a:t>
+            </a:r>
+          </a:p>
+          <a:p>
+            <a:pPr marL="285750" indent="-285750">
+              <a:buFont typeface="Arial" panose="020B0604020202020204" pitchFamily="34" charset="0"/>
+              <a:buChar char="•"/>
+            </a:pPr>
+            <a:r>
+              <a:rPr lang="en-GB" dirty="0"/>
+              <a:t>Assess integrability of the arithmetic unit utilising approximate computing into a RISC-V SoC</a:t>
             </a:r>
           </a:p>
           <a:p>
@@ -19953,75 +19215,10 @@
               <a:buChar char="•"/>
             </a:pPr>
             <a:r>
-              <a:rPr lang="en-GB" dirty="0"/>
-              <a:t>Optimize the arithmetic unit for energy efficiency while maintaining acceptable computational accuracy.</a:t>
-            </a:r>
-          </a:p>
-        </p:txBody>
-      </p:sp>
-      <p:sp>
-        <p:nvSpPr>
-          <p:cNvPr id="5" name="Text Placeholder 4">
-            <a:extLst>
-              <a:ext uri="{FF2B5EF4-FFF2-40B4-BE49-F238E27FC236}">
-                <a16:creationId xmlns:a16="http://schemas.microsoft.com/office/drawing/2014/main" id="{E81BA2B5-6A90-4204-ABDD-7183FBB03A02}"/>
-              </a:ext>
-            </a:extLst>
-          </p:cNvPr>
-          <p:cNvSpPr>
-            <a:spLocks noGrp="1"/>
-          </p:cNvSpPr>
-          <p:nvPr>
-            <p:ph type="body" sz="quarter" idx="23"/>
-          </p:nvPr>
-        </p:nvSpPr>
-        <p:spPr>
-          <a:xfrm>
-            <a:off x="5920595" y="3379680"/>
-            <a:ext cx="5433204" cy="365125"/>
-          </a:xfrm>
-        </p:spPr>
-        <p:txBody>
-          <a:bodyPr rtlCol="0">
-            <a:normAutofit lnSpcReduction="10000"/>
-          </a:bodyPr>
-          <a:lstStyle/>
-          <a:p>
-            <a:pPr rtl="0"/>
-            <a:r>
-              <a:rPr lang="en-GB" b="1" dirty="0"/>
-              <a:t>OBJECTIVES</a:t>
-            </a:r>
-          </a:p>
-        </p:txBody>
-      </p:sp>
-      <p:sp>
-        <p:nvSpPr>
-          <p:cNvPr id="6" name="Text Placeholder 5">
-            <a:extLst>
-              <a:ext uri="{FF2B5EF4-FFF2-40B4-BE49-F238E27FC236}">
-                <a16:creationId xmlns:a16="http://schemas.microsoft.com/office/drawing/2014/main" id="{7E7D4C34-22A0-4D54-A07D-E1E9A11463E5}"/>
-              </a:ext>
-            </a:extLst>
-          </p:cNvPr>
-          <p:cNvSpPr>
-            <a:spLocks noGrp="1"/>
-          </p:cNvSpPr>
-          <p:nvPr>
-            <p:ph type="body" sz="quarter" idx="24"/>
-          </p:nvPr>
-        </p:nvSpPr>
-        <p:spPr>
-          <a:xfrm>
-            <a:off x="5920169" y="3709104"/>
-            <a:ext cx="5431971" cy="2342446"/>
-          </a:xfrm>
-        </p:spPr>
-        <p:txBody>
-          <a:bodyPr rtlCol="0">
-            <a:normAutofit lnSpcReduction="10000"/>
-          </a:bodyPr>
-          <a:lstStyle/>
+              <a:rPr lang="en-US" dirty="0"/>
+              <a:t>Design and simulate the MAC unit using Verilog on FPGA</a:t>
+            </a:r>
+          </a:p>
           <a:p>
             <a:pPr marL="285750" indent="-285750" rtl="0">
               <a:buFont typeface="Arial" panose="020B0604020202020204" pitchFamily="34" charset="0"/>
@@ -20029,7 +19226,7 @@
             </a:pPr>
             <a:r>
               <a:rPr lang="en-US" dirty="0"/>
-              <a:t>Design and simulate the MAC unit using Verilog on FPGA</a:t>
+              <a:t>Evaluate, analyze and compare performance, power consumption, and accuracy against traditional designs</a:t>
             </a:r>
           </a:p>
           <a:p>
@@ -20038,49 +19235,16 @@
               <a:buChar char="•"/>
             </a:pPr>
             <a:r>
-              <a:rPr lang="en-US" dirty="0"/>
-              <a:t>Integrate the MAC unit into a RISC-V SoC</a:t>
-            </a:r>
-          </a:p>
-          <a:p>
-            <a:pPr marL="285750" indent="-285750" rtl="0">
+              <a:rPr lang="en-GB" dirty="0"/>
+              <a:t>Assess the impact of approximation on computational accuracy</a:t>
+            </a:r>
+          </a:p>
+          <a:p>
+            <a:pPr marL="285750" indent="-285750">
               <a:buFont typeface="Arial" panose="020B0604020202020204" pitchFamily="34" charset="0"/>
               <a:buChar char="•"/>
             </a:pPr>
-            <a:r>
-              <a:rPr lang="en-US" dirty="0"/>
-              <a:t>Evaluate, analyze and compare performance, power consumption, and accuracy against traditional designs</a:t>
-            </a:r>
-          </a:p>
-          <a:p>
-            <a:pPr marL="285750" indent="-285750" rtl="0">
-              <a:buFont typeface="Arial" panose="020B0604020202020204" pitchFamily="34" charset="0"/>
-              <a:buChar char="•"/>
-            </a:pPr>
-            <a:r>
-              <a:rPr lang="en-GB" dirty="0"/>
-              <a:t>Validate the design using simulation tools</a:t>
-            </a:r>
-          </a:p>
-          <a:p>
-            <a:pPr marL="285750" indent="-285750" rtl="0">
-              <a:buFont typeface="Arial" panose="020B0604020202020204" pitchFamily="34" charset="0"/>
-              <a:buChar char="•"/>
-            </a:pPr>
-            <a:r>
-              <a:rPr lang="en-GB" dirty="0"/>
-              <a:t>Assess the impact of approximation on computational accuracy</a:t>
-            </a:r>
-          </a:p>
-          <a:p>
-            <a:pPr marL="285750" indent="-285750" rtl="0">
-              <a:buFont typeface="Arial" panose="020B0604020202020204" pitchFamily="34" charset="0"/>
-              <a:buChar char="•"/>
-            </a:pPr>
-            <a:r>
-              <a:rPr lang="en-GB" dirty="0"/>
-              <a:t>Evaluate the MAC unit’s performance in a fuzzy memoized FIR filter for image processing</a:t>
-            </a:r>
+            <a:endParaRPr lang="en-GB" dirty="0"/>
           </a:p>
         </p:txBody>
       </p:sp>
@@ -20202,273 +19366,6 @@
 </file>
 
 <file path=ppt/slides/slide6.xml><?xml version="1.0" encoding="utf-8"?>
-<p:sld xmlns:a="http://schemas.openxmlformats.org/drawingml/2006/main" xmlns:r="http://schemas.openxmlformats.org/officeDocument/2006/relationships" xmlns:p="http://schemas.openxmlformats.org/presentationml/2006/main">
-  <p:cSld>
-    <p:spTree>
-      <p:nvGrpSpPr>
-        <p:cNvPr id="1" name=""/>
-        <p:cNvGrpSpPr/>
-        <p:nvPr/>
-      </p:nvGrpSpPr>
-      <p:grpSpPr>
-        <a:xfrm>
-          <a:off x="0" y="0"/>
-          <a:ext cx="0" cy="0"/>
-          <a:chOff x="0" y="0"/>
-          <a:chExt cx="0" cy="0"/>
-        </a:xfrm>
-      </p:grpSpPr>
-      <p:sp>
-        <p:nvSpPr>
-          <p:cNvPr id="2" name="Title 1">
-            <a:extLst>
-              <a:ext uri="{FF2B5EF4-FFF2-40B4-BE49-F238E27FC236}">
-                <a16:creationId xmlns:a16="http://schemas.microsoft.com/office/drawing/2014/main" id="{537E1C88-627C-4655-A4FB-0BB02EDB078A}"/>
-              </a:ext>
-            </a:extLst>
-          </p:cNvPr>
-          <p:cNvSpPr>
-            <a:spLocks noGrp="1"/>
-          </p:cNvSpPr>
-          <p:nvPr>
-            <p:ph type="title"/>
-          </p:nvPr>
-        </p:nvSpPr>
-        <p:spPr>
-          <a:xfrm>
-            <a:off x="1362074" y="781287"/>
-            <a:ext cx="5111750" cy="608481"/>
-          </a:xfrm>
-        </p:spPr>
-        <p:txBody>
-          <a:bodyPr rtlCol="0"/>
-          <a:lstStyle/>
-          <a:p>
-            <a:pPr rtl="0"/>
-            <a:r>
-              <a:rPr lang="en-GB" dirty="0"/>
-              <a:t>Problem specification</a:t>
-            </a:r>
-          </a:p>
-        </p:txBody>
-      </p:sp>
-      <p:sp>
-        <p:nvSpPr>
-          <p:cNvPr id="3" name="Content Placeholder 2">
-            <a:extLst>
-              <a:ext uri="{FF2B5EF4-FFF2-40B4-BE49-F238E27FC236}">
-                <a16:creationId xmlns:a16="http://schemas.microsoft.com/office/drawing/2014/main" id="{033634FE-ADF0-4BC3-A0A9-447EA9DD096B}"/>
-              </a:ext>
-            </a:extLst>
-          </p:cNvPr>
-          <p:cNvSpPr>
-            <a:spLocks noGrp="1"/>
-          </p:cNvSpPr>
-          <p:nvPr>
-            <p:ph type="body" idx="1"/>
-          </p:nvPr>
-        </p:nvSpPr>
-        <p:spPr>
-          <a:xfrm>
-            <a:off x="1333498" y="2409384"/>
-            <a:ext cx="6958855" cy="2660512"/>
-          </a:xfrm>
-        </p:spPr>
-        <p:txBody>
-          <a:bodyPr vert="horz" lIns="91440" tIns="45720" rIns="91440" bIns="45720" rtlCol="0" anchor="t">
-            <a:normAutofit fontScale="92500" lnSpcReduction="10000"/>
-          </a:bodyPr>
-          <a:lstStyle/>
-          <a:p>
-            <a:pPr rtl="0"/>
-            <a:r>
-              <a:rPr lang="en-US" b="1" dirty="0"/>
-              <a:t>Problem</a:t>
-            </a:r>
-            <a:r>
-              <a:rPr lang="en-US" dirty="0"/>
-              <a:t>: </a:t>
-            </a:r>
-          </a:p>
-          <a:p>
-            <a:pPr marL="285750" indent="-285750" rtl="0">
-              <a:buFont typeface="Arial" panose="020B0604020202020204" pitchFamily="34" charset="0"/>
-              <a:buChar char="•"/>
-            </a:pPr>
-            <a:r>
-              <a:rPr lang="en-US" dirty="0"/>
-              <a:t>Balancing accuracy, power consumption, and speed in arithmetic units</a:t>
-            </a:r>
-          </a:p>
-          <a:p>
-            <a:r>
-              <a:rPr lang="en-US" b="1" dirty="0"/>
-              <a:t>Expected Results</a:t>
-            </a:r>
-            <a:r>
-              <a:rPr lang="en-US" dirty="0"/>
-              <a:t>:</a:t>
-            </a:r>
-          </a:p>
-          <a:p>
-            <a:pPr marL="285750" indent="-285750">
-              <a:buFont typeface="Arial" panose="020B0604020202020204" pitchFamily="34" charset="0"/>
-              <a:buChar char="•"/>
-            </a:pPr>
-            <a:r>
-              <a:rPr lang="en-US" dirty="0"/>
-              <a:t>Enhanced computational efficiency with minimal accuracy loss</a:t>
-            </a:r>
-          </a:p>
-          <a:p>
-            <a:pPr marL="285750" indent="-285750">
-              <a:buFont typeface="Arial" panose="020B0604020202020204" pitchFamily="34" charset="0"/>
-              <a:buChar char="•"/>
-            </a:pPr>
-            <a:r>
-              <a:rPr lang="en-US" dirty="0"/>
-              <a:t>Reduced power consumption and chip area</a:t>
-            </a:r>
-          </a:p>
-          <a:p>
-            <a:r>
-              <a:rPr lang="en-GB" b="1" dirty="0"/>
-              <a:t>Methodology</a:t>
-            </a:r>
-            <a:r>
-              <a:rPr lang="en-GB" dirty="0"/>
-              <a:t>:</a:t>
-            </a:r>
-          </a:p>
-          <a:p>
-            <a:pPr marL="285750" indent="-285750">
-              <a:buFont typeface="Arial" panose="020B0604020202020204" pitchFamily="34" charset="0"/>
-              <a:buChar char="•"/>
-            </a:pPr>
-            <a:r>
-              <a:rPr lang="en-GB" dirty="0"/>
-              <a:t>Using Verilog for implementation and FPGA simulations</a:t>
-            </a:r>
-          </a:p>
-          <a:p>
-            <a:pPr marL="285750" indent="-285750">
-              <a:buFont typeface="Arial" panose="020B0604020202020204" pitchFamily="34" charset="0"/>
-              <a:buChar char="•"/>
-            </a:pPr>
-            <a:r>
-              <a:rPr lang="en-US" dirty="0"/>
-              <a:t>Implementing Approximate Adders and Approximate Multipliers based on existing designs</a:t>
-            </a:r>
-            <a:endParaRPr lang="en-GB" dirty="0"/>
-          </a:p>
-          <a:p>
-            <a:pPr marL="285750" indent="-285750">
-              <a:buFont typeface="Arial" panose="020B0604020202020204" pitchFamily="34" charset="0"/>
-              <a:buChar char="•"/>
-            </a:pPr>
-            <a:endParaRPr lang="en-GB" dirty="0"/>
-          </a:p>
-          <a:p>
-            <a:pPr marL="285750" indent="-285750">
-              <a:buFont typeface="Arial" panose="020B0604020202020204" pitchFamily="34" charset="0"/>
-              <a:buChar char="•"/>
-            </a:pPr>
-            <a:endParaRPr lang="en-US" dirty="0"/>
-          </a:p>
-          <a:p>
-            <a:pPr rtl="0"/>
-            <a:endParaRPr lang="en-GB" noProof="1"/>
-          </a:p>
-        </p:txBody>
-      </p:sp>
-      <p:sp>
-        <p:nvSpPr>
-          <p:cNvPr id="6" name="Slide Number Placeholder 5">
-            <a:extLst>
-              <a:ext uri="{FF2B5EF4-FFF2-40B4-BE49-F238E27FC236}">
-                <a16:creationId xmlns:a16="http://schemas.microsoft.com/office/drawing/2014/main" id="{C23C3221-5F04-4CA7-A86A-EEA8566A1735}"/>
-              </a:ext>
-            </a:extLst>
-          </p:cNvPr>
-          <p:cNvSpPr>
-            <a:spLocks noGrp="1"/>
-          </p:cNvSpPr>
-          <p:nvPr>
-            <p:ph type="sldNum" sz="quarter" idx="12"/>
-          </p:nvPr>
-        </p:nvSpPr>
-        <p:spPr>
-          <a:xfrm>
-            <a:off x="8610600" y="6356350"/>
-            <a:ext cx="2743200" cy="365125"/>
-          </a:xfrm>
-        </p:spPr>
-        <p:txBody>
-          <a:bodyPr rtlCol="0"/>
-          <a:lstStyle/>
-          <a:p>
-            <a:pPr rtl="0"/>
-            <a:fld id="{B5CEABB6-07DC-46E8-9B57-56EC44A396E5}" type="slidenum">
-              <a:rPr lang="en-GB" smtClean="0">
-                <a:solidFill>
-                  <a:schemeClr val="tx1"/>
-                </a:solidFill>
-              </a:rPr>
-              <a:pPr rtl="0"/>
-              <a:t>6</a:t>
-            </a:fld>
-            <a:endParaRPr lang="en-GB" dirty="0">
-              <a:solidFill>
-                <a:schemeClr val="tx1"/>
-              </a:solidFill>
-            </a:endParaRPr>
-          </a:p>
-        </p:txBody>
-      </p:sp>
-      <p:pic>
-        <p:nvPicPr>
-          <p:cNvPr id="7" name="Picture 6" descr="A purple text on a black background&#10;&#10;AI-generated content may be incorrect.">
-            <a:extLst>
-              <a:ext uri="{FF2B5EF4-FFF2-40B4-BE49-F238E27FC236}">
-                <a16:creationId xmlns:a16="http://schemas.microsoft.com/office/drawing/2014/main" id="{94E43E32-1EBB-00D6-C8B5-74596A9FD54A}"/>
-              </a:ext>
-            </a:extLst>
-          </p:cNvPr>
-          <p:cNvPicPr>
-            <a:picLocks noChangeAspect="1"/>
-          </p:cNvPicPr>
-          <p:nvPr/>
-        </p:nvPicPr>
-        <p:blipFill>
-          <a:blip r:embed="rId3"/>
-          <a:stretch>
-            <a:fillRect/>
-          </a:stretch>
-        </p:blipFill>
-        <p:spPr>
-          <a:xfrm>
-            <a:off x="65368" y="6089513"/>
-            <a:ext cx="2536261" cy="768487"/>
-          </a:xfrm>
-          <a:prstGeom prst="rect">
-            <a:avLst/>
-          </a:prstGeom>
-        </p:spPr>
-      </p:pic>
-    </p:spTree>
-    <p:extLst>
-      <p:ext uri="{BB962C8B-B14F-4D97-AF65-F5344CB8AC3E}">
-        <p14:creationId xmlns:p14="http://schemas.microsoft.com/office/powerpoint/2010/main" val="1346372204"/>
-      </p:ext>
-    </p:extLst>
-  </p:cSld>
-  <p:clrMapOvr>
-    <a:masterClrMapping/>
-  </p:clrMapOvr>
-</p:sld>
-</file>
-
-<file path=ppt/slides/slide7.xml><?xml version="1.0" encoding="utf-8"?>
 <p:sld xmlns:a="http://schemas.openxmlformats.org/drawingml/2006/main" xmlns:r="http://schemas.openxmlformats.org/officeDocument/2006/relationships" xmlns:p="http://schemas.openxmlformats.org/presentationml/2006/main">
   <p:cSld>
     <p:spTree>
@@ -20561,7 +19458,7 @@
                 </a:solidFill>
               </a:rPr>
               <a:pPr rtl="0"/>
-              <a:t>7</a:t>
+              <a:t>6</a:t>
             </a:fld>
             <a:endParaRPr lang="en-GB" dirty="0">
               <a:solidFill>
@@ -20751,10 +19648,7 @@
               <a:rPr lang="en-GB" b="1" dirty="0"/>
               <a:t>8-bit operands (A and B)</a:t>
             </a:r>
-            <a:r>
-              <a:rPr lang="en-GB" dirty="0"/>
-              <a:t> for multiplication</a:t>
-            </a:r>
+            <a:endParaRPr lang="en-GB" dirty="0"/>
           </a:p>
           <a:p>
             <a:pPr marL="285750" marR="0" lvl="0" indent="-285750" algn="l" defTabSz="914400" rtl="0" eaLnBrk="0" fontAlgn="base" latinLnBrk="0" hangingPunct="0">
@@ -20852,15 +19746,7 @@
             </a:pPr>
             <a:r>
               <a:rPr lang="en-GB" dirty="0"/>
-              <a:t>Uses </a:t>
-            </a:r>
-            <a:r>
-              <a:rPr lang="en-GB" b="1" dirty="0"/>
-              <a:t>Hamming distance</a:t>
-            </a:r>
-            <a:r>
-              <a:rPr lang="en-GB" dirty="0"/>
-              <a:t> to find a similar previously stored input-output pair.</a:t>
+              <a:t>Instead of storing the exact result for an exact input we store results for approximate matches.</a:t>
             </a:r>
             <a:endParaRPr lang="en-US" dirty="0"/>
           </a:p>
@@ -21125,10 +20011,10 @@
       </p:sp>
       <p:pic>
         <p:nvPicPr>
-          <p:cNvPr id="4" name="Graphic 3">
-            <a:extLst>
-              <a:ext uri="{FF2B5EF4-FFF2-40B4-BE49-F238E27FC236}">
-                <a16:creationId xmlns:a16="http://schemas.microsoft.com/office/drawing/2014/main" id="{17D5BD9B-4E40-E593-0B5F-494E29EC06F6}"/>
+          <p:cNvPr id="10" name="Graphic 9">
+            <a:extLst>
+              <a:ext uri="{FF2B5EF4-FFF2-40B4-BE49-F238E27FC236}">
+                <a16:creationId xmlns:a16="http://schemas.microsoft.com/office/drawing/2014/main" id="{49577611-80C1-0692-13C1-2F4647F0B87D}"/>
               </a:ext>
             </a:extLst>
           </p:cNvPr>
@@ -21151,8 +20037,8 @@
         </p:blipFill>
         <p:spPr>
           <a:xfrm>
-            <a:off x="8122025" y="365228"/>
-            <a:ext cx="3138207" cy="5991122"/>
+            <a:off x="7906909" y="735612"/>
+            <a:ext cx="4105275" cy="4200525"/>
           </a:xfrm>
           <a:prstGeom prst="rect">
             <a:avLst/>
@@ -21172,7 +20058,7 @@
 </p:sld>
 </file>
 
-<file path=ppt/slides/slide8.xml><?xml version="1.0" encoding="utf-8"?>
+<file path=ppt/slides/slide7.xml><?xml version="1.0" encoding="utf-8"?>
 <p:sld xmlns:a="http://schemas.openxmlformats.org/drawingml/2006/main" xmlns:r="http://schemas.openxmlformats.org/officeDocument/2006/relationships" xmlns:p="http://schemas.openxmlformats.org/presentationml/2006/main">
   <p:cSld>
     <p:spTree>
@@ -21208,23 +20094,19 @@
         <p:spPr>
           <a:xfrm>
             <a:off x="5918057" y="461920"/>
-            <a:ext cx="5037726" cy="846301"/>
+            <a:ext cx="5037726" cy="510145"/>
           </a:xfrm>
         </p:spPr>
         <p:txBody>
           <a:bodyPr rtlCol="0">
-            <a:normAutofit fontScale="90000"/>
+            <a:normAutofit/>
           </a:bodyPr>
           <a:lstStyle/>
           <a:p>
             <a:pPr rtl="0"/>
             <a:r>
-              <a:rPr lang="en-US" b="1" dirty="0"/>
-              <a:t>Comparison:</a:t>
-            </a:r>
-            <a:r>
               <a:rPr lang="en-US" dirty="0"/>
-              <a:t> Aims and milestones</a:t>
+              <a:t>What has been achieved</a:t>
             </a:r>
             <a:endParaRPr lang="en-GB" dirty="0"/>
           </a:p>
@@ -21269,43 +20151,6 @@
       </p:sp>
       <p:sp>
         <p:nvSpPr>
-          <p:cNvPr id="8" name="Text Placeholder 7">
-            <a:extLst>
-              <a:ext uri="{FF2B5EF4-FFF2-40B4-BE49-F238E27FC236}">
-                <a16:creationId xmlns:a16="http://schemas.microsoft.com/office/drawing/2014/main" id="{F5C3A7BE-F7FC-4942-A31A-491A8A806103}"/>
-              </a:ext>
-            </a:extLst>
-          </p:cNvPr>
-          <p:cNvSpPr>
-            <a:spLocks noGrp="1"/>
-          </p:cNvSpPr>
-          <p:nvPr>
-            <p:ph type="body" sz="quarter" idx="23"/>
-          </p:nvPr>
-        </p:nvSpPr>
-        <p:spPr>
-          <a:xfrm>
-            <a:off x="5918936" y="4082298"/>
-            <a:ext cx="5433204" cy="365125"/>
-          </a:xfrm>
-        </p:spPr>
-        <p:txBody>
-          <a:bodyPr vert="horz" lIns="91440" tIns="45720" rIns="91440" bIns="45720" rtlCol="0" anchor="t">
-            <a:noAutofit/>
-          </a:bodyPr>
-          <a:lstStyle/>
-          <a:p>
-            <a:pPr rtl="0"/>
-            <a:r>
-              <a:rPr lang="en-GB" b="1" dirty="0"/>
-              <a:t>Pending Tasks</a:t>
-            </a:r>
-            <a:endParaRPr lang="en-GB" b="1" noProof="1"/>
-          </a:p>
-        </p:txBody>
-      </p:sp>
-      <p:sp>
-        <p:nvSpPr>
           <p:cNvPr id="4" name="Slide Number Placeholder 3">
             <a:extLst>
               <a:ext uri="{FF2B5EF4-FFF2-40B4-BE49-F238E27FC236}">
@@ -21338,7 +20183,7 @@
                 </a:solidFill>
               </a:rPr>
               <a:pPr rtl="0"/>
-              <a:t>8</a:t>
+              <a:t>7</a:t>
             </a:fld>
             <a:endParaRPr lang="en-GB" dirty="0">
               <a:solidFill>
@@ -21366,8 +20211,8 @@
         </p:nvSpPr>
         <p:spPr bwMode="auto">
           <a:xfrm>
-            <a:off x="5921375" y="2601109"/>
-            <a:ext cx="5064784" cy="954107"/>
+            <a:off x="5918057" y="2970439"/>
+            <a:ext cx="5061257" cy="1169551"/>
           </a:xfrm>
           <a:prstGeom prst="rect">
             <a:avLst/>
@@ -21469,6 +20314,22 @@
             </a:r>
           </a:p>
           <a:p>
+            <a:pPr eaLnBrk="0" fontAlgn="base" hangingPunct="0">
+              <a:spcBef>
+                <a:spcPct val="0"/>
+              </a:spcBef>
+              <a:spcAft>
+                <a:spcPct val="0"/>
+              </a:spcAft>
+              <a:buFontTx/>
+              <a:buChar char="•"/>
+            </a:pPr>
+            <a:r>
+              <a:rPr lang="en-US" altLang="en-US" dirty="0"/>
+              <a:t> Implemented Fuzzy memoization cache look up</a:t>
+            </a:r>
+          </a:p>
+          <a:p>
             <a:pPr marL="0" marR="0" lvl="0" indent="0" algn="l" defTabSz="914400" rtl="0" eaLnBrk="0" fontAlgn="base" latinLnBrk="0" hangingPunct="0">
               <a:lnSpc>
                 <a:spcPct val="100000"/>
@@ -21487,159 +20348,7 @@
             </a:pPr>
             <a:r>
               <a:rPr lang="en-US" altLang="en-US" dirty="0"/>
-              <a:t> Completed integration of approximate multipliers and adders</a:t>
-            </a:r>
-          </a:p>
-        </p:txBody>
-      </p:sp>
-      <p:sp>
-        <p:nvSpPr>
-          <p:cNvPr id="14" name="Rectangle 4">
-            <a:extLst>
-              <a:ext uri="{FF2B5EF4-FFF2-40B4-BE49-F238E27FC236}">
-                <a16:creationId xmlns:a16="http://schemas.microsoft.com/office/drawing/2014/main" id="{C4C25FFF-01A9-75AF-C09C-C09B33E1A65C}"/>
-              </a:ext>
-            </a:extLst>
-          </p:cNvPr>
-          <p:cNvSpPr>
-            <a:spLocks noGrp="1" noChangeArrowheads="1"/>
-          </p:cNvSpPr>
-          <p:nvPr>
-            <p:ph type="body" sz="quarter" idx="24"/>
-          </p:nvPr>
-        </p:nvSpPr>
-        <p:spPr bwMode="auto">
-          <a:xfrm>
-            <a:off x="5918057" y="4498022"/>
-            <a:ext cx="5987072" cy="954107"/>
-          </a:xfrm>
-          <a:prstGeom prst="rect">
-            <a:avLst/>
-          </a:prstGeom>
-          <a:noFill/>
-          <a:ln>
-            <a:noFill/>
-          </a:ln>
-          <a:effectLst/>
-          <a:extLst>
-            <a:ext uri="{909E8E84-426E-40DD-AFC4-6F175D3DCCD1}">
-              <a14:hiddenFill xmlns:a14="http://schemas.microsoft.com/office/drawing/2010/main">
-                <a:solidFill>
-                  <a:schemeClr val="accent1"/>
-                </a:solidFill>
-              </a14:hiddenFill>
-            </a:ext>
-            <a:ext uri="{91240B29-F687-4F45-9708-019B960494DF}">
-              <a14:hiddenLine xmlns:a14="http://schemas.microsoft.com/office/drawing/2010/main" w="9525">
-                <a:solidFill>
-                  <a:schemeClr val="tx1"/>
-                </a:solidFill>
-                <a:miter lim="800000"/>
-                <a:headEnd/>
-                <a:tailEnd/>
-              </a14:hiddenLine>
-            </a:ext>
-            <a:ext uri="{AF507438-7753-43E0-B8FC-AC1667EBCBE1}">
-              <a14:hiddenEffects xmlns:a14="http://schemas.microsoft.com/office/drawing/2010/main">
-                <a:effectLst>
-                  <a:outerShdw dist="35921" dir="2700000" algn="ctr" rotWithShape="0">
-                    <a:schemeClr val="bg2"/>
-                  </a:outerShdw>
-                </a:effectLst>
-              </a14:hiddenEffects>
-            </a:ext>
-          </a:extLst>
-        </p:spPr>
-        <p:txBody>
-          <a:bodyPr vert="horz" wrap="square" lIns="91440" tIns="45720" rIns="91440" bIns="45720" numCol="1" anchor="ctr" anchorCtr="0" compatLnSpc="1">
-            <a:prstTxWarp prst="textNoShape">
-              <a:avLst/>
-            </a:prstTxWarp>
-            <a:spAutoFit/>
-          </a:bodyPr>
-          <a:lstStyle/>
-          <a:p>
-            <a:pPr marL="0" marR="0" lvl="0" indent="0" algn="l" defTabSz="914400" rtl="0" eaLnBrk="0" fontAlgn="base" latinLnBrk="0" hangingPunct="0">
-              <a:lnSpc>
-                <a:spcPct val="100000"/>
-              </a:lnSpc>
-              <a:spcBef>
-                <a:spcPct val="0"/>
-              </a:spcBef>
-              <a:spcAft>
-                <a:spcPct val="0"/>
-              </a:spcAft>
-              <a:buClrTx/>
-              <a:buSzTx/>
-              <a:buFontTx/>
-              <a:buChar char="•"/>
-              <a:tabLst/>
-            </a:pPr>
-            <a:r>
-              <a:rPr lang="en-US" altLang="en-US" dirty="0"/>
-              <a:t> Explore Fuzzy memoization implementation</a:t>
-            </a:r>
-          </a:p>
-          <a:p>
-            <a:pPr marL="0" marR="0" lvl="0" indent="0" algn="l" defTabSz="914400" rtl="0" eaLnBrk="0" fontAlgn="base" latinLnBrk="0" hangingPunct="0">
-              <a:lnSpc>
-                <a:spcPct val="100000"/>
-              </a:lnSpc>
-              <a:spcBef>
-                <a:spcPct val="0"/>
-              </a:spcBef>
-              <a:spcAft>
-                <a:spcPct val="0"/>
-              </a:spcAft>
-              <a:buClrTx/>
-              <a:buSzTx/>
-              <a:buFontTx/>
-              <a:buChar char="•"/>
-              <a:tabLst/>
-            </a:pPr>
-            <a:r>
-              <a:rPr lang="en-US" altLang="en-US" dirty="0"/>
-              <a:t> Research and Learn how to implement a RISC-V SoC on FPGA</a:t>
-            </a:r>
-          </a:p>
-          <a:p>
-            <a:pPr marL="0" marR="0" lvl="0" indent="0" algn="l" defTabSz="914400" rtl="0" eaLnBrk="0" fontAlgn="base" latinLnBrk="0" hangingPunct="0">
-              <a:lnSpc>
-                <a:spcPct val="100000"/>
-              </a:lnSpc>
-              <a:spcBef>
-                <a:spcPct val="0"/>
-              </a:spcBef>
-              <a:spcAft>
-                <a:spcPct val="0"/>
-              </a:spcAft>
-              <a:buClrTx/>
-              <a:buSzTx/>
-              <a:buFontTx/>
-              <a:buChar char="•"/>
-              <a:tabLst/>
-            </a:pPr>
-            <a:r>
-              <a:rPr lang="en-US" altLang="en-US" dirty="0"/>
-              <a:t> Conduct comprehensive testing for power, speed, and accuracy</a:t>
-            </a:r>
-          </a:p>
-          <a:p>
-            <a:pPr eaLnBrk="0" fontAlgn="base" hangingPunct="0">
-              <a:spcBef>
-                <a:spcPct val="0"/>
-              </a:spcBef>
-              <a:spcAft>
-                <a:spcPct val="0"/>
-              </a:spcAft>
-              <a:buFontTx/>
-              <a:buChar char="•"/>
-            </a:pPr>
-            <a:r>
-              <a:rPr lang="en-US" altLang="en-US" dirty="0">
-                <a:latin typeface="Tenorite (Body)"/>
-              </a:rPr>
-              <a:t> Compare against other approximation units to evaluate performance</a:t>
+              <a:t> Researched on implementing onto RISC-V SoC</a:t>
             </a:r>
           </a:p>
         </p:txBody>
@@ -21759,7 +20468,7 @@
 </p:sld>
 </file>
 
-<file path=ppt/slides/slide9.xml><?xml version="1.0" encoding="utf-8"?>
+<file path=ppt/slides/slide8.xml><?xml version="1.0" encoding="utf-8"?>
 <p:sld xmlns:a="http://schemas.openxmlformats.org/drawingml/2006/main" xmlns:r="http://schemas.openxmlformats.org/officeDocument/2006/relationships" xmlns:p="http://schemas.openxmlformats.org/presentationml/2006/main">
   <p:cSld>
     <p:bg>
@@ -21953,7 +20662,7 @@
             <a:fld id="{B5CEABB6-07DC-46E8-9B57-56EC44A396E5}" type="slidenum">
               <a:rPr lang="en-GB" sz="900" smtClean="0"/>
               <a:pPr algn="r"/>
-              <a:t>9</a:t>
+              <a:t>8</a:t>
             </a:fld>
             <a:endParaRPr lang="en-GB" dirty="0"/>
           </a:p>
@@ -22053,6 +20762,309 @@
     <p:extLst>
       <p:ext uri="{BB962C8B-B14F-4D97-AF65-F5344CB8AC3E}">
         <p14:creationId xmlns:p14="http://schemas.microsoft.com/office/powerpoint/2010/main" val="3007507314"/>
+      </p:ext>
+    </p:extLst>
+  </p:cSld>
+  <p:clrMapOvr>
+    <a:masterClrMapping/>
+  </p:clrMapOvr>
+</p:sld>
+</file>
+
+<file path=ppt/slides/slide9.xml><?xml version="1.0" encoding="utf-8"?>
+<p:sld xmlns:a="http://schemas.openxmlformats.org/drawingml/2006/main" xmlns:r="http://schemas.openxmlformats.org/officeDocument/2006/relationships" xmlns:p="http://schemas.openxmlformats.org/presentationml/2006/main">
+  <p:cSld>
+    <p:bg>
+      <p:bgPr>
+        <a:solidFill>
+          <a:schemeClr val="accent1"/>
+        </a:solidFill>
+        <a:effectLst/>
+      </p:bgPr>
+    </p:bg>
+    <p:spTree>
+      <p:nvGrpSpPr>
+        <p:cNvPr id="1" name="">
+          <a:extLst>
+            <a:ext uri="{FF2B5EF4-FFF2-40B4-BE49-F238E27FC236}">
+              <a16:creationId xmlns:a16="http://schemas.microsoft.com/office/drawing/2014/main" id="{0123FABB-3156-19E0-34B5-36241A5EB0EC}"/>
+            </a:ext>
+          </a:extLst>
+        </p:cNvPr>
+        <p:cNvGrpSpPr/>
+        <p:nvPr/>
+      </p:nvGrpSpPr>
+      <p:grpSpPr>
+        <a:xfrm>
+          <a:off x="0" y="0"/>
+          <a:ext cx="0" cy="0"/>
+          <a:chOff x="0" y="0"/>
+          <a:chExt cx="0" cy="0"/>
+        </a:xfrm>
+      </p:grpSpPr>
+      <p:pic>
+        <p:nvPicPr>
+          <p:cNvPr id="6" name="Picture 5">
+            <a:extLst>
+              <a:ext uri="{FF2B5EF4-FFF2-40B4-BE49-F238E27FC236}">
+                <a16:creationId xmlns:a16="http://schemas.microsoft.com/office/drawing/2014/main" id="{F1135473-FD36-2CB3-70F9-6BDA0992AC45}"/>
+              </a:ext>
+            </a:extLst>
+          </p:cNvPr>
+          <p:cNvPicPr>
+            <a:picLocks noChangeAspect="1"/>
+          </p:cNvPicPr>
+          <p:nvPr/>
+        </p:nvPicPr>
+        <p:blipFill>
+          <a:blip r:embed="rId3"/>
+          <a:stretch>
+            <a:fillRect/>
+          </a:stretch>
+        </p:blipFill>
+        <p:spPr>
+          <a:xfrm>
+            <a:off x="65368" y="1132719"/>
+            <a:ext cx="5339491" cy="5682907"/>
+          </a:xfrm>
+          <a:prstGeom prst="rect">
+            <a:avLst/>
+          </a:prstGeom>
+        </p:spPr>
+      </p:pic>
+      <p:sp>
+        <p:nvSpPr>
+          <p:cNvPr id="2" name="Title 1">
+            <a:extLst>
+              <a:ext uri="{FF2B5EF4-FFF2-40B4-BE49-F238E27FC236}">
+                <a16:creationId xmlns:a16="http://schemas.microsoft.com/office/drawing/2014/main" id="{E19C496A-CE83-B5EB-2C9B-03DDECAEB53C}"/>
+              </a:ext>
+            </a:extLst>
+          </p:cNvPr>
+          <p:cNvSpPr>
+            <a:spLocks noGrp="1"/>
+          </p:cNvSpPr>
+          <p:nvPr>
+            <p:ph type="ctrTitle"/>
+          </p:nvPr>
+        </p:nvSpPr>
+        <p:spPr>
+          <a:xfrm>
+            <a:off x="6675960" y="1619260"/>
+            <a:ext cx="5063801" cy="1715531"/>
+          </a:xfrm>
+        </p:spPr>
+        <p:txBody>
+          <a:bodyPr rtlCol="0"/>
+          <a:lstStyle/>
+          <a:p>
+            <a:pPr rtl="0"/>
+            <a:r>
+              <a:rPr lang="en-GB" dirty="0">
+                <a:solidFill>
+                  <a:schemeClr val="tx1"/>
+                </a:solidFill>
+              </a:rPr>
+              <a:t>SIMULATION RESULTS - Multiplier</a:t>
+            </a:r>
+          </a:p>
+        </p:txBody>
+      </p:sp>
+      <p:sp>
+        <p:nvSpPr>
+          <p:cNvPr id="4" name="Slide Number Placeholder 5">
+            <a:extLst>
+              <a:ext uri="{FF2B5EF4-FFF2-40B4-BE49-F238E27FC236}">
+                <a16:creationId xmlns:a16="http://schemas.microsoft.com/office/drawing/2014/main" id="{17C511B7-38D9-A586-7FE5-5B08538DD8E4}"/>
+              </a:ext>
+            </a:extLst>
+          </p:cNvPr>
+          <p:cNvSpPr txBox="1">
+            <a:spLocks/>
+          </p:cNvSpPr>
+          <p:nvPr/>
+        </p:nvSpPr>
+        <p:spPr>
+          <a:xfrm>
+            <a:off x="8610600" y="6356350"/>
+            <a:ext cx="2743200" cy="365125"/>
+          </a:xfrm>
+          <a:prstGeom prst="rect">
+            <a:avLst/>
+          </a:prstGeom>
+        </p:spPr>
+        <p:txBody>
+          <a:bodyPr rtlCol="0"/>
+          <a:lstStyle>
+            <a:defPPr rtl="0">
+              <a:defRPr lang="en-GB"/>
+            </a:defPPr>
+            <a:lvl1pPr marL="0" algn="l" defTabSz="914400" rtl="0" eaLnBrk="1" latinLnBrk="0" hangingPunct="1">
+              <a:defRPr sz="1800" kern="1200">
+                <a:solidFill>
+                  <a:schemeClr val="tx1"/>
+                </a:solidFill>
+                <a:latin typeface="+mn-lt"/>
+                <a:ea typeface="+mn-ea"/>
+                <a:cs typeface="+mn-cs"/>
+              </a:defRPr>
+            </a:lvl1pPr>
+            <a:lvl2pPr marL="457200" algn="l" defTabSz="914400" rtl="0" eaLnBrk="1" latinLnBrk="0" hangingPunct="1">
+              <a:defRPr sz="1800" kern="1200">
+                <a:solidFill>
+                  <a:schemeClr val="tx1"/>
+                </a:solidFill>
+                <a:latin typeface="+mn-lt"/>
+                <a:ea typeface="+mn-ea"/>
+                <a:cs typeface="+mn-cs"/>
+              </a:defRPr>
+            </a:lvl2pPr>
+            <a:lvl3pPr marL="914400" algn="l" defTabSz="914400" rtl="0" eaLnBrk="1" latinLnBrk="0" hangingPunct="1">
+              <a:defRPr sz="1800" kern="1200">
+                <a:solidFill>
+                  <a:schemeClr val="tx1"/>
+                </a:solidFill>
+                <a:latin typeface="+mn-lt"/>
+                <a:ea typeface="+mn-ea"/>
+                <a:cs typeface="+mn-cs"/>
+              </a:defRPr>
+            </a:lvl3pPr>
+            <a:lvl4pPr marL="1371600" algn="l" defTabSz="914400" rtl="0" eaLnBrk="1" latinLnBrk="0" hangingPunct="1">
+              <a:defRPr sz="1800" kern="1200">
+                <a:solidFill>
+                  <a:schemeClr val="tx1"/>
+                </a:solidFill>
+                <a:latin typeface="+mn-lt"/>
+                <a:ea typeface="+mn-ea"/>
+                <a:cs typeface="+mn-cs"/>
+              </a:defRPr>
+            </a:lvl4pPr>
+            <a:lvl5pPr marL="1828800" algn="l" defTabSz="914400" rtl="0" eaLnBrk="1" latinLnBrk="0" hangingPunct="1">
+              <a:defRPr sz="1800" kern="1200">
+                <a:solidFill>
+                  <a:schemeClr val="tx1"/>
+                </a:solidFill>
+                <a:latin typeface="+mn-lt"/>
+                <a:ea typeface="+mn-ea"/>
+                <a:cs typeface="+mn-cs"/>
+              </a:defRPr>
+            </a:lvl5pPr>
+            <a:lvl6pPr marL="2286000" algn="l" defTabSz="914400" rtl="0" eaLnBrk="1" latinLnBrk="0" hangingPunct="1">
+              <a:defRPr sz="1800" kern="1200">
+                <a:solidFill>
+                  <a:schemeClr val="tx1"/>
+                </a:solidFill>
+                <a:latin typeface="+mn-lt"/>
+                <a:ea typeface="+mn-ea"/>
+                <a:cs typeface="+mn-cs"/>
+              </a:defRPr>
+            </a:lvl6pPr>
+            <a:lvl7pPr marL="2743200" algn="l" defTabSz="914400" rtl="0" eaLnBrk="1" latinLnBrk="0" hangingPunct="1">
+              <a:defRPr sz="1800" kern="1200">
+                <a:solidFill>
+                  <a:schemeClr val="tx1"/>
+                </a:solidFill>
+                <a:latin typeface="+mn-lt"/>
+                <a:ea typeface="+mn-ea"/>
+                <a:cs typeface="+mn-cs"/>
+              </a:defRPr>
+            </a:lvl7pPr>
+            <a:lvl8pPr marL="3200400" algn="l" defTabSz="914400" rtl="0" eaLnBrk="1" latinLnBrk="0" hangingPunct="1">
+              <a:defRPr sz="1800" kern="1200">
+                <a:solidFill>
+                  <a:schemeClr val="tx1"/>
+                </a:solidFill>
+                <a:latin typeface="+mn-lt"/>
+                <a:ea typeface="+mn-ea"/>
+                <a:cs typeface="+mn-cs"/>
+              </a:defRPr>
+            </a:lvl8pPr>
+            <a:lvl9pPr marL="3657600" algn="l" defTabSz="914400" rtl="0" eaLnBrk="1" latinLnBrk="0" hangingPunct="1">
+              <a:defRPr sz="1800" kern="1200">
+                <a:solidFill>
+                  <a:schemeClr val="tx1"/>
+                </a:solidFill>
+                <a:latin typeface="+mn-lt"/>
+                <a:ea typeface="+mn-ea"/>
+                <a:cs typeface="+mn-cs"/>
+              </a:defRPr>
+            </a:lvl9pPr>
+          </a:lstStyle>
+          <a:p>
+            <a:pPr algn="r"/>
+            <a:fld id="{B5CEABB6-07DC-46E8-9B57-56EC44A396E5}" type="slidenum">
+              <a:rPr lang="en-GB" sz="900" smtClean="0"/>
+              <a:pPr algn="r"/>
+              <a:t>9</a:t>
+            </a:fld>
+            <a:endParaRPr lang="en-GB" dirty="0"/>
+          </a:p>
+        </p:txBody>
+      </p:sp>
+      <p:pic>
+        <p:nvPicPr>
+          <p:cNvPr id="5" name="Picture 4">
+            <a:extLst>
+              <a:ext uri="{FF2B5EF4-FFF2-40B4-BE49-F238E27FC236}">
+                <a16:creationId xmlns:a16="http://schemas.microsoft.com/office/drawing/2014/main" id="{086190A1-15C5-955E-EE8A-7F174371A61E}"/>
+              </a:ext>
+            </a:extLst>
+          </p:cNvPr>
+          <p:cNvPicPr>
+            <a:picLocks noChangeAspect="1"/>
+          </p:cNvPicPr>
+          <p:nvPr/>
+        </p:nvPicPr>
+        <p:blipFill>
+          <a:blip r:embed="rId4"/>
+          <a:stretch>
+            <a:fillRect/>
+          </a:stretch>
+        </p:blipFill>
+        <p:spPr>
+          <a:xfrm>
+            <a:off x="31376" y="42374"/>
+            <a:ext cx="12129247" cy="982262"/>
+          </a:xfrm>
+          <a:prstGeom prst="rect">
+            <a:avLst/>
+          </a:prstGeom>
+        </p:spPr>
+      </p:pic>
+      <p:pic>
+        <p:nvPicPr>
+          <p:cNvPr id="7" name="Picture 6">
+            <a:extLst>
+              <a:ext uri="{FF2B5EF4-FFF2-40B4-BE49-F238E27FC236}">
+                <a16:creationId xmlns:a16="http://schemas.microsoft.com/office/drawing/2014/main" id="{E7DB5234-806B-E445-8FC5-869EFBC57BF4}"/>
+              </a:ext>
+            </a:extLst>
+          </p:cNvPr>
+          <p:cNvPicPr>
+            <a:picLocks noChangeAspect="1"/>
+          </p:cNvPicPr>
+          <p:nvPr/>
+        </p:nvPicPr>
+        <p:blipFill>
+          <a:blip r:embed="rId5"/>
+          <a:stretch>
+            <a:fillRect/>
+          </a:stretch>
+        </p:blipFill>
+        <p:spPr>
+          <a:xfrm>
+            <a:off x="5614895" y="2961973"/>
+            <a:ext cx="1877714" cy="3853653"/>
+          </a:xfrm>
+          <a:prstGeom prst="rect">
+            <a:avLst/>
+          </a:prstGeom>
+        </p:spPr>
+      </p:pic>
+    </p:spTree>
+    <p:extLst>
+      <p:ext uri="{BB962C8B-B14F-4D97-AF65-F5344CB8AC3E}">
+        <p14:creationId xmlns:p14="http://schemas.microsoft.com/office/powerpoint/2010/main" val="874077177"/>
       </p:ext>
     </p:extLst>
   </p:cSld>

</xml_diff>

<commit_message>
[Symposium] Final draft changes
</commit_message>
<xml_diff>
--- a/Documents/Symposium/Symposium.pptx
+++ b/Documents/Symposium/Symposium.pptx
@@ -18326,55 +18326,6 @@
       </p:sp>
       <p:sp>
         <p:nvSpPr>
-          <p:cNvPr id="7" name="Text Placeholder 6">
-            <a:extLst>
-              <a:ext uri="{FF2B5EF4-FFF2-40B4-BE49-F238E27FC236}">
-                <a16:creationId xmlns:a16="http://schemas.microsoft.com/office/drawing/2014/main" id="{301D392D-FB66-47A0-B628-5ADE822A2CFF}"/>
-              </a:ext>
-            </a:extLst>
-          </p:cNvPr>
-          <p:cNvSpPr>
-            <a:spLocks noGrp="1"/>
-          </p:cNvSpPr>
-          <p:nvPr>
-            <p:ph type="body" sz="quarter" idx="18"/>
-          </p:nvPr>
-        </p:nvSpPr>
-        <p:spPr>
-          <a:xfrm>
-            <a:off x="1484984" y="4070136"/>
-            <a:ext cx="4031945" cy="365125"/>
-          </a:xfrm>
-        </p:spPr>
-        <p:txBody>
-          <a:bodyPr rtlCol="0">
-            <a:normAutofit fontScale="92500" lnSpcReduction="10000"/>
-          </a:bodyPr>
-          <a:lstStyle/>
-          <a:p>
-            <a:pPr>
-              <a:lnSpc>
-                <a:spcPct val="100000"/>
-              </a:lnSpc>
-            </a:pPr>
-            <a:r>
-              <a:rPr lang="en-US" b="1" dirty="0">
-                <a:solidFill>
-                  <a:schemeClr val="tx1"/>
-                </a:solidFill>
-              </a:rPr>
-              <a:t>Fault Tolerance</a:t>
-            </a:r>
-            <a:endParaRPr lang="en-GB" b="1" dirty="0">
-              <a:solidFill>
-                <a:schemeClr val="tx1"/>
-              </a:solidFill>
-            </a:endParaRPr>
-          </a:p>
-        </p:txBody>
-      </p:sp>
-      <p:sp>
-        <p:nvSpPr>
           <p:cNvPr id="9" name="Text Placeholder 8">
             <a:extLst>
               <a:ext uri="{FF2B5EF4-FFF2-40B4-BE49-F238E27FC236}">
@@ -18391,7 +18342,7 @@
         </p:nvSpPr>
         <p:spPr>
           <a:xfrm>
-            <a:off x="6594627" y="4070135"/>
+            <a:off x="1484984" y="4119542"/>
             <a:ext cx="4031945" cy="365125"/>
           </a:xfrm>
         </p:spPr>
@@ -18669,10 +18620,10 @@
       </p:sp>
       <p:sp>
         <p:nvSpPr>
-          <p:cNvPr id="14" name="Rectangle 3">
-            <a:extLst>
-              <a:ext uri="{FF2B5EF4-FFF2-40B4-BE49-F238E27FC236}">
-                <a16:creationId xmlns:a16="http://schemas.microsoft.com/office/drawing/2014/main" id="{9B177820-F1B0-44C6-9916-644EFE389E2C}"/>
+          <p:cNvPr id="15" name="Rectangle 4">
+            <a:extLst>
+              <a:ext uri="{FF2B5EF4-FFF2-40B4-BE49-F238E27FC236}">
+                <a16:creationId xmlns:a16="http://schemas.microsoft.com/office/drawing/2014/main" id="{8789A8B0-9139-4053-7859-F2D3EEF8E03A}"/>
               </a:ext>
             </a:extLst>
           </p:cNvPr>
@@ -18680,105 +18631,12 @@
             <a:spLocks noGrp="1" noChangeArrowheads="1"/>
           </p:cNvSpPr>
           <p:nvPr>
-            <p:ph type="body" sz="quarter" idx="19"/>
+            <p:ph type="body" sz="quarter" idx="24"/>
           </p:nvPr>
         </p:nvSpPr>
         <p:spPr bwMode="auto">
           <a:xfrm>
-            <a:off x="1484984" y="4601605"/>
-            <a:ext cx="4031030" cy="738664"/>
-          </a:xfrm>
-          <a:prstGeom prst="rect">
-            <a:avLst/>
-          </a:prstGeom>
-          <a:noFill/>
-          <a:ln>
-            <a:noFill/>
-          </a:ln>
-          <a:effectLst/>
-          <a:extLst>
-            <a:ext uri="{909E8E84-426E-40DD-AFC4-6F175D3DCCD1}">
-              <a14:hiddenFill xmlns:a14="http://schemas.microsoft.com/office/drawing/2010/main">
-                <a:solidFill>
-                  <a:schemeClr val="accent1"/>
-                </a:solidFill>
-              </a14:hiddenFill>
-            </a:ext>
-            <a:ext uri="{91240B29-F687-4F45-9708-019B960494DF}">
-              <a14:hiddenLine xmlns:a14="http://schemas.microsoft.com/office/drawing/2010/main" w="9525">
-                <a:solidFill>
-                  <a:schemeClr val="tx1"/>
-                </a:solidFill>
-                <a:miter lim="800000"/>
-                <a:headEnd/>
-                <a:tailEnd/>
-              </a14:hiddenLine>
-            </a:ext>
-            <a:ext uri="{AF507438-7753-43E0-B8FC-AC1667EBCBE1}">
-              <a14:hiddenEffects xmlns:a14="http://schemas.microsoft.com/office/drawing/2010/main">
-                <a:effectLst>
-                  <a:outerShdw dist="35921" dir="2700000" algn="ctr" rotWithShape="0">
-                    <a:schemeClr val="bg2"/>
-                  </a:outerShdw>
-                </a:effectLst>
-              </a14:hiddenEffects>
-            </a:ext>
-          </a:extLst>
-        </p:spPr>
-        <p:txBody>
-          <a:bodyPr vert="horz" wrap="square" lIns="91440" tIns="45720" rIns="91440" bIns="45720" numCol="1" anchor="ctr" anchorCtr="0" compatLnSpc="1">
-            <a:prstTxWarp prst="textNoShape">
-              <a:avLst/>
-            </a:prstTxWarp>
-            <a:spAutoFit/>
-          </a:bodyPr>
-          <a:lstStyle/>
-          <a:p>
-            <a:pPr algn="l" eaLnBrk="0" fontAlgn="base" hangingPunct="0">
-              <a:spcBef>
-                <a:spcPct val="0"/>
-              </a:spcBef>
-              <a:spcAft>
-                <a:spcPct val="0"/>
-              </a:spcAft>
-            </a:pPr>
-            <a:r>
-              <a:rPr lang="en-GB" dirty="0">
-                <a:solidFill>
-                  <a:schemeClr val="tx1"/>
-                </a:solidFill>
-                <a:latin typeface="Tenorite (Body)"/>
-              </a:rPr>
-              <a:t>Improves system reliability by allowing for approximate results during faults or hardware failures</a:t>
-            </a:r>
-            <a:endParaRPr lang="en-US" altLang="en-US" dirty="0">
-              <a:solidFill>
-                <a:schemeClr val="tx1"/>
-              </a:solidFill>
-              <a:latin typeface="Tenorite (Body)"/>
-            </a:endParaRPr>
-          </a:p>
-        </p:txBody>
-      </p:sp>
-      <p:sp>
-        <p:nvSpPr>
-          <p:cNvPr id="15" name="Rectangle 4">
-            <a:extLst>
-              <a:ext uri="{FF2B5EF4-FFF2-40B4-BE49-F238E27FC236}">
-                <a16:creationId xmlns:a16="http://schemas.microsoft.com/office/drawing/2014/main" id="{8789A8B0-9139-4053-7859-F2D3EEF8E03A}"/>
-              </a:ext>
-            </a:extLst>
-          </p:cNvPr>
-          <p:cNvSpPr>
-            <a:spLocks noGrp="1" noChangeArrowheads="1"/>
-          </p:cNvSpPr>
-          <p:nvPr>
-            <p:ph type="body" sz="quarter" idx="24"/>
-          </p:nvPr>
-        </p:nvSpPr>
-        <p:spPr bwMode="auto">
-          <a:xfrm>
-            <a:off x="6672629" y="4601605"/>
+            <a:off x="1484984" y="4627606"/>
             <a:ext cx="3634215" cy="738664"/>
           </a:xfrm>
           <a:prstGeom prst="rect">
@@ -20943,10 +20801,10 @@
       </p:sp>
       <p:pic>
         <p:nvPicPr>
-          <p:cNvPr id="5" name="Picture 4">
-            <a:extLst>
-              <a:ext uri="{FF2B5EF4-FFF2-40B4-BE49-F238E27FC236}">
-                <a16:creationId xmlns:a16="http://schemas.microsoft.com/office/drawing/2014/main" id="{086190A1-15C5-955E-EE8A-7F174371A61E}"/>
+          <p:cNvPr id="6" name="Picture 5">
+            <a:extLst>
+              <a:ext uri="{FF2B5EF4-FFF2-40B4-BE49-F238E27FC236}">
+                <a16:creationId xmlns:a16="http://schemas.microsoft.com/office/drawing/2014/main" id="{2362E88F-9E25-55A1-72E1-B51042E34660}"/>
               </a:ext>
             </a:extLst>
           </p:cNvPr>
@@ -20963,8 +20821,8 @@
         </p:blipFill>
         <p:spPr>
           <a:xfrm>
-            <a:off x="31376" y="42374"/>
-            <a:ext cx="12129247" cy="982262"/>
+            <a:off x="0" y="0"/>
+            <a:ext cx="12192000" cy="1912471"/>
           </a:xfrm>
           <a:prstGeom prst="rect">
             <a:avLst/>
@@ -21776,15 +21634,6 @@
 </file>
 
 <file path=customXml/item1.xml><?xml version="1.0" encoding="utf-8"?>
-<?mso-contentType ?>
-<FormTemplates xmlns="http://schemas.microsoft.com/sharepoint/v3/contenttype/forms">
-  <Display>DocumentLibraryForm</Display>
-  <Edit>DocumentLibraryForm</Edit>
-  <New>DocumentLibraryForm</New>
-</FormTemplates>
-</file>
-
-<file path=customXml/item2.xml><?xml version="1.0" encoding="utf-8"?>
 <p:properties xmlns:p="http://schemas.microsoft.com/office/2006/metadata/properties" xmlns:xsi="http://www.w3.org/2001/XMLSchema-instance" xmlns:pc="http://schemas.microsoft.com/office/infopath/2007/PartnerControls">
   <documentManagement>
     <_ip_UnifiedCompliancePolicyUIAction xmlns="http://schemas.microsoft.com/sharepoint/v3" xsi:nil="true"/>
@@ -21801,6 +21650,15 @@
     <MediaServiceKeyPoints xmlns="71af3243-3dd4-4a8d-8c0d-dd76da1f02a5" xsi:nil="true"/>
   </documentManagement>
 </p:properties>
+</file>
+
+<file path=customXml/item2.xml><?xml version="1.0" encoding="utf-8"?>
+<?mso-contentType ?>
+<FormTemplates xmlns="http://schemas.microsoft.com/sharepoint/v3/contenttype/forms">
+  <Display>DocumentLibraryForm</Display>
+  <Edit>DocumentLibraryForm</Edit>
+  <New>DocumentLibraryForm</New>
+</FormTemplates>
 </file>
 
 <file path=customXml/item3.xml><?xml version="1.0" encoding="utf-8"?>
@@ -22080,14 +21938,6 @@
 </file>
 
 <file path=customXml/itemProps1.xml><?xml version="1.0" encoding="utf-8"?>
-<ds:datastoreItem xmlns:ds="http://schemas.openxmlformats.org/officeDocument/2006/customXml" ds:itemID="{2D446390-8521-40A2-A462-EA068123BED9}">
-  <ds:schemaRefs>
-    <ds:schemaRef ds:uri="http://schemas.microsoft.com/sharepoint/v3/contenttype/forms"/>
-  </ds:schemaRefs>
-</ds:datastoreItem>
-</file>
-
-<file path=customXml/itemProps2.xml><?xml version="1.0" encoding="utf-8"?>
 <ds:datastoreItem xmlns:ds="http://schemas.openxmlformats.org/officeDocument/2006/customXml" ds:itemID="{B5BA3906-9696-4247-AC0D-DD5C26B2A70A}">
   <ds:schemaRefs>
     <ds:schemaRef ds:uri="http://schemas.microsoft.com/office/2006/metadata/properties"/>
@@ -22095,6 +21945,14 @@
     <ds:schemaRef ds:uri="http://schemas.microsoft.com/sharepoint/v3"/>
     <ds:schemaRef ds:uri="71af3243-3dd4-4a8d-8c0d-dd76da1f02a5"/>
     <ds:schemaRef ds:uri="230e9df3-be65-4c73-a93b-d1236ebd677e"/>
+  </ds:schemaRefs>
+</ds:datastoreItem>
+</file>
+
+<file path=customXml/itemProps2.xml><?xml version="1.0" encoding="utf-8"?>
+<ds:datastoreItem xmlns:ds="http://schemas.openxmlformats.org/officeDocument/2006/customXml" ds:itemID="{2D446390-8521-40A2-A462-EA068123BED9}">
+  <ds:schemaRefs>
+    <ds:schemaRef ds:uri="http://schemas.microsoft.com/sharepoint/v3/contenttype/forms"/>
   </ds:schemaRefs>
 </ds:datastoreItem>
 </file>

</xml_diff>